<commit_message>
Update the article Foundry Local.
</commit_message>
<xml_diff>
--- a/articles/2025/foundry-local-preview/FoundryLocal251018.pptx
+++ b/articles/2025/foundry-local-preview/FoundryLocal251018.pptx
@@ -9378,12 +9378,48 @@
           </a:fontRef>
         </p:style>
       </p:cxnSp>
+      <p:sp>
+        <p:nvSpPr>
+          <p:cNvPr id="36" name="文本框 35">
+            <a:extLst>
+              <a:ext uri="{FF2B5EF4-FFF2-40B4-BE49-F238E27FC236}">
+                <a16:creationId xmlns:a16="http://schemas.microsoft.com/office/drawing/2014/main" id="{9EED0202-4FC0-EF9A-DEE7-1F62CE6BF969}"/>
+              </a:ext>
+            </a:extLst>
+          </p:cNvPr>
+          <p:cNvSpPr txBox="1"/>
+          <p:nvPr/>
+        </p:nvSpPr>
+        <p:spPr>
+          <a:xfrm>
+            <a:off x="9278052" y="1331795"/>
+            <a:ext cx="2217274" cy="307777"/>
+          </a:xfrm>
+          <a:prstGeom prst="rect">
+            <a:avLst/>
+          </a:prstGeom>
+          <a:noFill/>
+        </p:spPr>
+        <p:txBody>
+          <a:bodyPr wrap="none" rtlCol="0">
+            <a:spAutoFit/>
+          </a:bodyPr>
+          <a:lstStyle/>
+          <a:p>
+            <a:r>
+              <a:rPr lang="en-US" altLang="zh-CN" sz="1400" dirty="0"/>
+              <a:t>Azure AI Foundry Catalog</a:t>
+            </a:r>
+            <a:endParaRPr lang="zh-CN" altLang="en-US" sz="1400" dirty="0"/>
+          </a:p>
+        </p:txBody>
+      </p:sp>
       <p:cxnSp>
         <p:nvCxnSpPr>
-          <p:cNvPr id="34" name="连接符: 肘形 33">
-            <a:extLst>
-              <a:ext uri="{FF2B5EF4-FFF2-40B4-BE49-F238E27FC236}">
-                <a16:creationId xmlns:a16="http://schemas.microsoft.com/office/drawing/2014/main" id="{323D54C0-6C4C-A959-E93B-E5B6FFEAB1EA}"/>
+          <p:cNvPr id="10" name="连接符: 曲线 9">
+            <a:extLst>
+              <a:ext uri="{FF2B5EF4-FFF2-40B4-BE49-F238E27FC236}">
+                <a16:creationId xmlns:a16="http://schemas.microsoft.com/office/drawing/2014/main" id="{CC18CFF1-1D71-B36B-8A35-4C7A0B57F5B1}"/>
               </a:ext>
             </a:extLst>
           </p:cNvPr>
@@ -9399,10 +9435,10 @@
             <a:off x="9379717" y="3912511"/>
             <a:ext cx="66754" cy="1873552"/>
           </a:xfrm>
-          <a:prstGeom prst="bentConnector4">
+          <a:prstGeom prst="curvedConnector4">
             <a:avLst>
-              <a:gd name="adj1" fmla="val -342451"/>
-              <a:gd name="adj2" fmla="val 68943"/>
+              <a:gd name="adj1" fmla="val -440294"/>
+              <a:gd name="adj2" fmla="val 63714"/>
             </a:avLst>
           </a:prstGeom>
           <a:ln>
@@ -9431,42 +9467,6 @@
           </a:fontRef>
         </p:style>
       </p:cxnSp>
-      <p:sp>
-        <p:nvSpPr>
-          <p:cNvPr id="36" name="文本框 35">
-            <a:extLst>
-              <a:ext uri="{FF2B5EF4-FFF2-40B4-BE49-F238E27FC236}">
-                <a16:creationId xmlns:a16="http://schemas.microsoft.com/office/drawing/2014/main" id="{9EED0202-4FC0-EF9A-DEE7-1F62CE6BF969}"/>
-              </a:ext>
-            </a:extLst>
-          </p:cNvPr>
-          <p:cNvSpPr txBox="1"/>
-          <p:nvPr/>
-        </p:nvSpPr>
-        <p:spPr>
-          <a:xfrm>
-            <a:off x="9278052" y="1331795"/>
-            <a:ext cx="2217274" cy="307777"/>
-          </a:xfrm>
-          <a:prstGeom prst="rect">
-            <a:avLst/>
-          </a:prstGeom>
-          <a:noFill/>
-        </p:spPr>
-        <p:txBody>
-          <a:bodyPr wrap="none" rtlCol="0">
-            <a:spAutoFit/>
-          </a:bodyPr>
-          <a:lstStyle/>
-          <a:p>
-            <a:r>
-              <a:rPr lang="en-US" altLang="zh-CN" sz="1400" dirty="0"/>
-              <a:t>Azure AI Foundry Catalog</a:t>
-            </a:r>
-            <a:endParaRPr lang="zh-CN" altLang="en-US" sz="1400" dirty="0"/>
-          </a:p>
-        </p:txBody>
-      </p:sp>
     </p:spTree>
     <p:extLst>
       <p:ext uri="{BB962C8B-B14F-4D97-AF65-F5344CB8AC3E}">
@@ -9563,7 +9563,7 @@
             </a:br>
             <a:r>
               <a:rPr lang="en-US" altLang="zh-CN" sz="1400" dirty="0"/>
-              <a:t>(Manifest)</a:t>
+              <a:t>(manifest)</a:t>
             </a:r>
             <a:endParaRPr lang="zh-CN" altLang="en-US" sz="1400" dirty="0"/>
           </a:p>
@@ -12276,7 +12276,7 @@
           <p:nvPr>
             <p:extLst>
               <p:ext uri="{D42A27DB-BD31-4B8C-83A1-F6EECF244321}">
-                <p14:modId xmlns:p14="http://schemas.microsoft.com/office/powerpoint/2010/main" val="2844885495"/>
+                <p14:modId xmlns:p14="http://schemas.microsoft.com/office/powerpoint/2010/main" val="1594481130"/>
               </p:ext>
             </p:extLst>
           </p:nvPr>
@@ -12327,7 +12327,7 @@
                       <a:endParaRPr lang="zh-CN" altLang="en-US" sz="1400" dirty="0"/>
                     </a:p>
                   </a:txBody>
-                  <a:tcPr/>
+                  <a:tcPr anchor="ctr"/>
                 </a:tc>
                 <a:tc>
                   <a:txBody>
@@ -12343,7 +12343,7 @@
                       </a:endParaRPr>
                     </a:p>
                   </a:txBody>
-                  <a:tcPr/>
+                  <a:tcPr anchor="ctr"/>
                 </a:tc>
                 <a:tc>
                   <a:txBody>
@@ -12367,7 +12367,7 @@
                       </a:endParaRPr>
                     </a:p>
                   </a:txBody>
-                  <a:tcPr/>
+                  <a:tcPr anchor="ctr"/>
                 </a:tc>
                 <a:extLst>
                   <a:ext uri="{0D108BD9-81ED-4DB2-BD59-A6C34878D82A}">
@@ -12388,7 +12388,7 @@
                       <a:endParaRPr lang="zh-CN" altLang="en-US" sz="1400" dirty="0"/>
                     </a:p>
                   </a:txBody>
-                  <a:tcPr/>
+                  <a:tcPr anchor="ctr"/>
                 </a:tc>
                 <a:tc>
                   <a:txBody>
@@ -12404,7 +12404,7 @@
                       </a:endParaRPr>
                     </a:p>
                   </a:txBody>
-                  <a:tcPr/>
+                  <a:tcPr anchor="ctr"/>
                 </a:tc>
                 <a:tc>
                   <a:txBody>
@@ -12428,7 +12428,7 @@
                       </a:endParaRPr>
                     </a:p>
                   </a:txBody>
-                  <a:tcPr/>
+                  <a:tcPr anchor="ctr"/>
                 </a:tc>
                 <a:extLst>
                   <a:ext uri="{0D108BD9-81ED-4DB2-BD59-A6C34878D82A}">
@@ -12449,7 +12449,7 @@
                       <a:endParaRPr lang="zh-CN" altLang="en-US" sz="1400" dirty="0"/>
                     </a:p>
                   </a:txBody>
-                  <a:tcPr/>
+                  <a:tcPr anchor="ctr"/>
                 </a:tc>
                 <a:tc>
                   <a:txBody>
@@ -12465,7 +12465,7 @@
                       </a:endParaRPr>
                     </a:p>
                   </a:txBody>
-                  <a:tcPr/>
+                  <a:tcPr anchor="ctr"/>
                 </a:tc>
                 <a:tc>
                   <a:txBody>
@@ -12481,7 +12481,7 @@
                       </a:endParaRPr>
                     </a:p>
                   </a:txBody>
-                  <a:tcPr/>
+                  <a:tcPr anchor="ctr"/>
                 </a:tc>
                 <a:extLst>
                   <a:ext uri="{0D108BD9-81ED-4DB2-BD59-A6C34878D82A}">
@@ -12502,7 +12502,7 @@
                       <a:endParaRPr lang="zh-CN" altLang="en-US" sz="1400" dirty="0"/>
                     </a:p>
                   </a:txBody>
-                  <a:tcPr/>
+                  <a:tcPr anchor="ctr"/>
                 </a:tc>
                 <a:tc>
                   <a:txBody>
@@ -12518,7 +12518,7 @@
                       </a:endParaRPr>
                     </a:p>
                   </a:txBody>
-                  <a:tcPr/>
+                  <a:tcPr anchor="ctr"/>
                 </a:tc>
                 <a:tc>
                   <a:txBody>
@@ -12542,7 +12542,7 @@
                       </a:endParaRPr>
                     </a:p>
                   </a:txBody>
-                  <a:tcPr/>
+                  <a:tcPr anchor="ctr"/>
                 </a:tc>
                 <a:extLst>
                   <a:ext uri="{0D108BD9-81ED-4DB2-BD59-A6C34878D82A}">
@@ -12563,7 +12563,7 @@
                       <a:endParaRPr lang="zh-CN" altLang="en-US" sz="1400" dirty="0"/>
                     </a:p>
                   </a:txBody>
-                  <a:tcPr/>
+                  <a:tcPr anchor="ctr"/>
                 </a:tc>
                 <a:tc>
                   <a:txBody>
@@ -12579,7 +12579,7 @@
                       </a:endParaRPr>
                     </a:p>
                   </a:txBody>
-                  <a:tcPr/>
+                  <a:tcPr anchor="ctr"/>
                 </a:tc>
                 <a:tc>
                   <a:txBody>
@@ -12603,7 +12603,7 @@
                       </a:endParaRPr>
                     </a:p>
                   </a:txBody>
-                  <a:tcPr/>
+                  <a:tcPr anchor="ctr"/>
                 </a:tc>
                 <a:extLst>
                   <a:ext uri="{0D108BD9-81ED-4DB2-BD59-A6C34878D82A}">
@@ -12767,6 +12767,51 @@
           </a:prstGeom>
         </p:spPr>
       </p:pic>
+      <p:cxnSp>
+        <p:nvCxnSpPr>
+          <p:cNvPr id="2" name="连接符: 肘形 1">
+            <a:extLst>
+              <a:ext uri="{FF2B5EF4-FFF2-40B4-BE49-F238E27FC236}">
+                <a16:creationId xmlns:a16="http://schemas.microsoft.com/office/drawing/2014/main" id="{EAC4095C-3904-1BAE-E6F4-35D5781A8624}"/>
+              </a:ext>
+            </a:extLst>
+          </p:cNvPr>
+          <p:cNvCxnSpPr>
+            <a:cxnSpLocks/>
+            <a:stCxn id="4" idx="3"/>
+          </p:cNvCxnSpPr>
+          <p:nvPr/>
+        </p:nvCxnSpPr>
+        <p:spPr>
+          <a:xfrm>
+            <a:off x="4806817" y="1865446"/>
+            <a:ext cx="309469" cy="453211"/>
+          </a:xfrm>
+          <a:prstGeom prst="bentConnector2">
+            <a:avLst/>
+          </a:prstGeom>
+          <a:ln>
+            <a:solidFill>
+              <a:srgbClr val="FFC000"/>
+            </a:solidFill>
+            <a:tailEnd type="triangle"/>
+          </a:ln>
+        </p:spPr>
+        <p:style>
+          <a:lnRef idx="2">
+            <a:schemeClr val="accent1"/>
+          </a:lnRef>
+          <a:fillRef idx="0">
+            <a:schemeClr val="accent1"/>
+          </a:fillRef>
+          <a:effectRef idx="1">
+            <a:schemeClr val="accent1"/>
+          </a:effectRef>
+          <a:fontRef idx="minor">
+            <a:schemeClr val="tx1"/>
+          </a:fontRef>
+        </p:style>
+      </p:cxnSp>
     </p:spTree>
     <p:extLst>
       <p:ext uri="{BB962C8B-B14F-4D97-AF65-F5344CB8AC3E}">

</xml_diff>

<commit_message>
Update a blog article.
</commit_message>
<xml_diff>
--- a/articles/2025/foundry-local-preview/FoundryLocal251018.pptx
+++ b/articles/2025/foundry-local-preview/FoundryLocal251018.pptx
@@ -5,17 +5,18 @@
     <p:sldMasterId id="2147483660" r:id="rId1"/>
   </p:sldMasterIdLst>
   <p:notesMasterIdLst>
-    <p:notesMasterId r:id="rId10"/>
+    <p:notesMasterId r:id="rId11"/>
   </p:notesMasterIdLst>
   <p:sldIdLst>
     <p:sldId id="256" r:id="rId2"/>
     <p:sldId id="265" r:id="rId3"/>
     <p:sldId id="260" r:id="rId4"/>
     <p:sldId id="261" r:id="rId5"/>
-    <p:sldId id="262" r:id="rId6"/>
-    <p:sldId id="270" r:id="rId7"/>
-    <p:sldId id="266" r:id="rId8"/>
-    <p:sldId id="258" r:id="rId9"/>
+    <p:sldId id="275" r:id="rId6"/>
+    <p:sldId id="262" r:id="rId7"/>
+    <p:sldId id="270" r:id="rId8"/>
+    <p:sldId id="266" r:id="rId9"/>
+    <p:sldId id="258" r:id="rId10"/>
   </p:sldIdLst>
   <p:sldSz cx="12192000" cy="6858000"/>
   <p:notesSz cx="6858000" cy="9144000"/>
@@ -204,7 +205,7 @@
           <a:p>
             <a:fld id="{503E49FF-1CBE-4B9C-8ECD-C3570D8460A5}" type="datetimeFigureOut">
               <a:rPr lang="zh-CN" altLang="en-US" smtClean="0"/>
-              <a:t>2025/10/24</a:t>
+              <a:t>2025/11/4</a:t>
             </a:fld>
             <a:endParaRPr lang="zh-CN" altLang="en-US"/>
           </a:p>
@@ -644,7 +645,7 @@
           <a:p>
             <a:fld id="{3D8F0EDA-F633-4540-BF89-A7E8DD1ECDDD}" type="slidenum">
               <a:rPr lang="zh-CN" altLang="en-US" smtClean="0"/>
-              <a:t>5</a:t>
+              <a:t>6</a:t>
             </a:fld>
             <a:endParaRPr lang="zh-CN" altLang="en-US"/>
           </a:p>
@@ -6243,7 +6244,7 @@
           </a:fontRef>
         </p:style>
         <p:txBody>
-          <a:bodyPr rtlCol="0" anchor="b"/>
+          <a:bodyPr rtlCol="0" anchor="t"/>
           <a:lstStyle/>
           <a:p>
             <a:pPr algn="ctr"/>
@@ -6974,7 +6975,7 @@
       </p:cxnSp>
       <p:sp>
         <p:nvSpPr>
-          <p:cNvPr id="50" name="矩形: 圆角 49">
+          <p:cNvPr id="50" name="流程图: 磁盘 49">
             <a:extLst>
               <a:ext uri="{FF2B5EF4-FFF2-40B4-BE49-F238E27FC236}">
                 <a16:creationId xmlns:a16="http://schemas.microsoft.com/office/drawing/2014/main" id="{8694984B-140F-1D6B-D547-737B5D98C6B9}"/>
@@ -6989,14 +6990,19 @@
             <a:off x="6991373" y="4523525"/>
             <a:ext cx="648000" cy="720000"/>
           </a:xfrm>
-          <a:prstGeom prst="roundRect">
+          <a:prstGeom prst="flowChartMagneticDisk">
             <a:avLst/>
           </a:prstGeom>
           <a:solidFill>
             <a:schemeClr val="accent3"/>
           </a:solidFill>
           <a:ln>
-            <a:noFill/>
+            <a:solidFill>
+              <a:schemeClr val="bg1">
+                <a:lumMod val="95000"/>
+                <a:lumOff val="5000"/>
+              </a:schemeClr>
+            </a:solidFill>
           </a:ln>
         </p:spPr>
         <p:style>
@@ -7026,7 +7032,7 @@
       </p:sp>
       <p:sp>
         <p:nvSpPr>
-          <p:cNvPr id="51" name="矩形: 圆角 50">
+          <p:cNvPr id="51" name="流程图: 磁盘 50">
             <a:extLst>
               <a:ext uri="{FF2B5EF4-FFF2-40B4-BE49-F238E27FC236}">
                 <a16:creationId xmlns:a16="http://schemas.microsoft.com/office/drawing/2014/main" id="{F731C0F8-EB7A-FCE0-F1CE-B9BB458C0D31}"/>
@@ -7041,14 +7047,19 @@
             <a:off x="7747221" y="4523525"/>
             <a:ext cx="648000" cy="720000"/>
           </a:xfrm>
-          <a:prstGeom prst="roundRect">
+          <a:prstGeom prst="flowChartMagneticDisk">
             <a:avLst/>
           </a:prstGeom>
           <a:solidFill>
             <a:schemeClr val="accent3"/>
           </a:solidFill>
           <a:ln>
-            <a:noFill/>
+            <a:solidFill>
+              <a:schemeClr val="bg1">
+                <a:lumMod val="95000"/>
+                <a:lumOff val="5000"/>
+              </a:schemeClr>
+            </a:solidFill>
           </a:ln>
         </p:spPr>
         <p:style>
@@ -7078,7 +7089,7 @@
       </p:sp>
       <p:sp>
         <p:nvSpPr>
-          <p:cNvPr id="52" name="矩形: 圆角 51">
+          <p:cNvPr id="52" name="流程图: 磁盘 51">
             <a:extLst>
               <a:ext uri="{FF2B5EF4-FFF2-40B4-BE49-F238E27FC236}">
                 <a16:creationId xmlns:a16="http://schemas.microsoft.com/office/drawing/2014/main" id="{D1BB491F-6476-E060-84F4-1938BF89DFB3}"/>
@@ -7093,14 +7104,19 @@
             <a:off x="8503069" y="4523525"/>
             <a:ext cx="648000" cy="720000"/>
           </a:xfrm>
-          <a:prstGeom prst="roundRect">
+          <a:prstGeom prst="flowChartMagneticDisk">
             <a:avLst/>
           </a:prstGeom>
           <a:solidFill>
             <a:schemeClr val="accent3"/>
           </a:solidFill>
           <a:ln>
-            <a:noFill/>
+            <a:solidFill>
+              <a:schemeClr val="bg1">
+                <a:lumMod val="95000"/>
+                <a:lumOff val="5000"/>
+              </a:schemeClr>
+            </a:solidFill>
           </a:ln>
         </p:spPr>
         <p:style>
@@ -7771,6 +7787,150 @@
               </a:schemeClr>
             </a:solidFill>
             <a:tailEnd type="triangle"/>
+          </a:ln>
+        </p:spPr>
+        <p:style>
+          <a:lnRef idx="2">
+            <a:schemeClr val="accent1"/>
+          </a:lnRef>
+          <a:fillRef idx="0">
+            <a:schemeClr val="accent1"/>
+          </a:fillRef>
+          <a:effectRef idx="1">
+            <a:schemeClr val="accent1"/>
+          </a:effectRef>
+          <a:fontRef idx="minor">
+            <a:schemeClr val="tx1"/>
+          </a:fontRef>
+        </p:style>
+      </p:cxnSp>
+      <p:sp>
+        <p:nvSpPr>
+          <p:cNvPr id="5" name="文本框 4">
+            <a:extLst>
+              <a:ext uri="{FF2B5EF4-FFF2-40B4-BE49-F238E27FC236}">
+                <a16:creationId xmlns:a16="http://schemas.microsoft.com/office/drawing/2014/main" id="{4C09FF51-BC0E-A05E-A12F-3F7443740939}"/>
+              </a:ext>
+            </a:extLst>
+          </p:cNvPr>
+          <p:cNvSpPr txBox="1"/>
+          <p:nvPr/>
+        </p:nvSpPr>
+        <p:spPr>
+          <a:xfrm>
+            <a:off x="7291784" y="5356767"/>
+            <a:ext cx="1867563" cy="461665"/>
+          </a:xfrm>
+          <a:prstGeom prst="rect">
+            <a:avLst/>
+          </a:prstGeom>
+          <a:noFill/>
+        </p:spPr>
+        <p:txBody>
+          <a:bodyPr wrap="none" rtlCol="0">
+            <a:spAutoFit/>
+          </a:bodyPr>
+          <a:lstStyle/>
+          <a:p>
+            <a:r>
+              <a:rPr lang="en-US" altLang="zh-CN" sz="1200" dirty="0">
+                <a:solidFill>
+                  <a:schemeClr val="tx1">
+                    <a:lumMod val="75000"/>
+                  </a:schemeClr>
+                </a:solidFill>
+              </a:rPr>
+              <a:t>%USERPROFILE%</a:t>
+            </a:r>
+            <a:br>
+              <a:rPr lang="en-US" altLang="zh-CN" sz="1200" dirty="0">
+                <a:solidFill>
+                  <a:schemeClr val="tx1">
+                    <a:lumMod val="75000"/>
+                  </a:schemeClr>
+                </a:solidFill>
+              </a:rPr>
+            </a:br>
+            <a:r>
+              <a:rPr lang="en-US" altLang="zh-CN" sz="1200" dirty="0">
+                <a:solidFill>
+                  <a:schemeClr val="tx1">
+                    <a:lumMod val="75000"/>
+                  </a:schemeClr>
+                </a:solidFill>
+              </a:rPr>
+              <a:t>\.foundry\cache\models</a:t>
+            </a:r>
+            <a:endParaRPr lang="zh-CN" altLang="en-US" sz="1200" dirty="0">
+              <a:solidFill>
+                <a:schemeClr val="tx1">
+                  <a:lumMod val="75000"/>
+                </a:schemeClr>
+              </a:solidFill>
+            </a:endParaRPr>
+          </a:p>
+        </p:txBody>
+      </p:sp>
+      <p:pic>
+        <p:nvPicPr>
+          <p:cNvPr id="17" name="图形 16" descr="打开文件夹 纯色填充">
+            <a:extLst>
+              <a:ext uri="{FF2B5EF4-FFF2-40B4-BE49-F238E27FC236}">
+                <a16:creationId xmlns:a16="http://schemas.microsoft.com/office/drawing/2014/main" id="{FDD85C09-12E8-5EBF-2CDA-84309C79B8FD}"/>
+              </a:ext>
+            </a:extLst>
+          </p:cNvPr>
+          <p:cNvPicPr>
+            <a:picLocks noChangeAspect="1"/>
+          </p:cNvPicPr>
+          <p:nvPr/>
+        </p:nvPicPr>
+        <p:blipFill>
+          <a:blip r:embed="rId2">
+            <a:extLst>
+              <a:ext uri="{96DAC541-7B7A-43D3-8B79-37D633B846F1}">
+                <asvg:svgBlip xmlns:asvg="http://schemas.microsoft.com/office/drawing/2016/SVG/main" r:embed="rId3"/>
+              </a:ext>
+            </a:extLst>
+          </a:blip>
+          <a:srcRect/>
+          <a:stretch/>
+        </p:blipFill>
+        <p:spPr>
+          <a:xfrm>
+            <a:off x="7006786" y="5443599"/>
+            <a:ext cx="288000" cy="288000"/>
+          </a:xfrm>
+          <a:prstGeom prst="rect">
+            <a:avLst/>
+          </a:prstGeom>
+        </p:spPr>
+      </p:pic>
+      <p:cxnSp>
+        <p:nvCxnSpPr>
+          <p:cNvPr id="20" name="直接连接符 19">
+            <a:extLst>
+              <a:ext uri="{FF2B5EF4-FFF2-40B4-BE49-F238E27FC236}">
+                <a16:creationId xmlns:a16="http://schemas.microsoft.com/office/drawing/2014/main" id="{AA89B9B6-5098-E05D-07CB-FB986C43A9A3}"/>
+              </a:ext>
+            </a:extLst>
+          </p:cNvPr>
+          <p:cNvCxnSpPr/>
+          <p:nvPr/>
+        </p:nvCxnSpPr>
+        <p:spPr>
+          <a:xfrm>
+            <a:off x="6815325" y="5356767"/>
+            <a:ext cx="2520000" cy="0"/>
+          </a:xfrm>
+          <a:prstGeom prst="line">
+            <a:avLst/>
+          </a:prstGeom>
+          <a:ln>
+            <a:solidFill>
+              <a:schemeClr val="accent6"/>
+            </a:solidFill>
+            <a:prstDash val="sysDot"/>
           </a:ln>
         </p:spPr>
         <p:style>
@@ -7809,6 +7969,3250 @@
         <p:cNvPr id="1" name="">
           <a:extLst>
             <a:ext uri="{FF2B5EF4-FFF2-40B4-BE49-F238E27FC236}">
+              <a16:creationId xmlns:a16="http://schemas.microsoft.com/office/drawing/2014/main" id="{FAFAB1C7-7C0E-94EF-795D-194E84A7CC62}"/>
+            </a:ext>
+          </a:extLst>
+        </p:cNvPr>
+        <p:cNvGrpSpPr/>
+        <p:nvPr/>
+      </p:nvGrpSpPr>
+      <p:grpSpPr>
+        <a:xfrm>
+          <a:off x="0" y="0"/>
+          <a:ext cx="0" cy="0"/>
+          <a:chOff x="0" y="0"/>
+          <a:chExt cx="0" cy="0"/>
+        </a:xfrm>
+      </p:grpSpPr>
+      <p:sp>
+        <p:nvSpPr>
+          <p:cNvPr id="70" name="矩形: 圆角 69">
+            <a:extLst>
+              <a:ext uri="{FF2B5EF4-FFF2-40B4-BE49-F238E27FC236}">
+                <a16:creationId xmlns:a16="http://schemas.microsoft.com/office/drawing/2014/main" id="{2B02E530-CEA5-7826-0756-6B911F2D27CE}"/>
+              </a:ext>
+            </a:extLst>
+          </p:cNvPr>
+          <p:cNvSpPr/>
+          <p:nvPr/>
+        </p:nvSpPr>
+        <p:spPr>
+          <a:xfrm>
+            <a:off x="6168676" y="2800927"/>
+            <a:ext cx="1944000" cy="2160000"/>
+          </a:xfrm>
+          <a:prstGeom prst="roundRect">
+            <a:avLst>
+              <a:gd name="adj" fmla="val 6462"/>
+            </a:avLst>
+          </a:prstGeom>
+          <a:noFill/>
+          <a:ln>
+            <a:solidFill>
+              <a:schemeClr val="accent6">
+                <a:lumMod val="75000"/>
+              </a:schemeClr>
+            </a:solidFill>
+          </a:ln>
+        </p:spPr>
+        <p:style>
+          <a:lnRef idx="2">
+            <a:schemeClr val="accent1">
+              <a:shade val="15000"/>
+            </a:schemeClr>
+          </a:lnRef>
+          <a:fillRef idx="1">
+            <a:schemeClr val="accent1"/>
+          </a:fillRef>
+          <a:effectRef idx="0">
+            <a:schemeClr val="accent1"/>
+          </a:effectRef>
+          <a:fontRef idx="minor">
+            <a:schemeClr val="lt1"/>
+          </a:fontRef>
+        </p:style>
+        <p:txBody>
+          <a:bodyPr rtlCol="0" anchor="ctr"/>
+          <a:lstStyle/>
+          <a:p>
+            <a:pPr algn="ctr"/>
+            <a:endParaRPr lang="zh-CN" altLang="en-US"/>
+          </a:p>
+        </p:txBody>
+      </p:sp>
+      <p:sp>
+        <p:nvSpPr>
+          <p:cNvPr id="47" name="矩形: 圆角 46">
+            <a:extLst>
+              <a:ext uri="{FF2B5EF4-FFF2-40B4-BE49-F238E27FC236}">
+                <a16:creationId xmlns:a16="http://schemas.microsoft.com/office/drawing/2014/main" id="{5A64EA8D-E75A-8F6F-40DD-06596287F32D}"/>
+              </a:ext>
+            </a:extLst>
+          </p:cNvPr>
+          <p:cNvSpPr/>
+          <p:nvPr/>
+        </p:nvSpPr>
+        <p:spPr>
+          <a:xfrm>
+            <a:off x="8256675" y="2800926"/>
+            <a:ext cx="3240000" cy="3600000"/>
+          </a:xfrm>
+          <a:prstGeom prst="roundRect">
+            <a:avLst>
+              <a:gd name="adj" fmla="val 2757"/>
+            </a:avLst>
+          </a:prstGeom>
+          <a:noFill/>
+          <a:ln>
+            <a:solidFill>
+              <a:schemeClr val="accent6">
+                <a:lumMod val="50000"/>
+              </a:schemeClr>
+            </a:solidFill>
+          </a:ln>
+        </p:spPr>
+        <p:style>
+          <a:lnRef idx="2">
+            <a:schemeClr val="accent1">
+              <a:shade val="15000"/>
+            </a:schemeClr>
+          </a:lnRef>
+          <a:fillRef idx="1">
+            <a:schemeClr val="accent1"/>
+          </a:fillRef>
+          <a:effectRef idx="0">
+            <a:schemeClr val="accent1"/>
+          </a:effectRef>
+          <a:fontRef idx="minor">
+            <a:schemeClr val="lt1"/>
+          </a:fontRef>
+        </p:style>
+        <p:txBody>
+          <a:bodyPr rtlCol="0" anchor="ctr"/>
+          <a:lstStyle/>
+          <a:p>
+            <a:pPr marL="171450" indent="-171450">
+              <a:buFont typeface="Arial" panose="020B0604020202020204" pitchFamily="34" charset="0"/>
+              <a:buChar char="•"/>
+            </a:pPr>
+            <a:r>
+              <a:rPr lang="en-US" altLang="zh-CN" sz="1200" b="1" dirty="0"/>
+              <a:t>Model Body</a:t>
+            </a:r>
+            <a:br>
+              <a:rPr lang="en-US" altLang="zh-CN" sz="1200" b="1" dirty="0"/>
+            </a:br>
+            <a:r>
+              <a:rPr lang="en-US" altLang="zh-CN" sz="1200" dirty="0">
+                <a:latin typeface="Consolas" panose="020B0609020204030204" pitchFamily="49" charset="0"/>
+              </a:rPr>
+              <a:t>.</a:t>
+            </a:r>
+            <a:r>
+              <a:rPr lang="en-US" altLang="zh-CN" sz="1200" dirty="0" err="1">
+                <a:latin typeface="Consolas" panose="020B0609020204030204" pitchFamily="49" charset="0"/>
+              </a:rPr>
+              <a:t>onnx</a:t>
+            </a:r>
+            <a:r>
+              <a:rPr lang="en-US" altLang="zh-CN" sz="1200" dirty="0"/>
+              <a:t> file and </a:t>
+            </a:r>
+            <a:r>
+              <a:rPr lang="en-US" altLang="zh-CN" sz="1200" dirty="0">
+                <a:latin typeface="Consolas" panose="020B0609020204030204" pitchFamily="49" charset="0"/>
+              </a:rPr>
+              <a:t>.</a:t>
+            </a:r>
+            <a:r>
+              <a:rPr lang="en-US" altLang="zh-CN" sz="1200" dirty="0" err="1">
+                <a:latin typeface="Consolas" panose="020B0609020204030204" pitchFamily="49" charset="0"/>
+              </a:rPr>
+              <a:t>onnx.data</a:t>
+            </a:r>
+            <a:r>
+              <a:rPr lang="en-US" altLang="zh-CN" sz="1200" dirty="0"/>
+              <a:t> file; and configuration reference files </a:t>
+            </a:r>
+            <a:r>
+              <a:rPr lang="en-US" altLang="zh-CN" sz="1200" dirty="0" err="1">
+                <a:latin typeface="Consolas" panose="020B0609020204030204" pitchFamily="49" charset="0"/>
+              </a:rPr>
+              <a:t>genai_config.json</a:t>
+            </a:r>
+            <a:r>
+              <a:rPr lang="en-US" altLang="zh-CN" sz="1200" dirty="0"/>
+              <a:t> that may exist generated by the Model Builder.</a:t>
+            </a:r>
+          </a:p>
+          <a:p>
+            <a:pPr marL="171450" indent="-171450">
+              <a:buFont typeface="Arial" panose="020B0604020202020204" pitchFamily="34" charset="0"/>
+              <a:buChar char="•"/>
+            </a:pPr>
+            <a:r>
+              <a:rPr lang="en-US" altLang="zh-CN" sz="1200" b="1" dirty="0"/>
+              <a:t>Basic information</a:t>
+            </a:r>
+            <a:br>
+              <a:rPr lang="en-US" altLang="zh-CN" sz="1200" b="1" dirty="0"/>
+            </a:br>
+            <a:r>
+              <a:rPr lang="en-US" altLang="zh-CN" sz="1200" dirty="0">
+                <a:latin typeface="Consolas" panose="020B0609020204030204" pitchFamily="49" charset="0"/>
+              </a:rPr>
+              <a:t>.</a:t>
+            </a:r>
+            <a:r>
+              <a:rPr lang="en-US" altLang="zh-CN" sz="1200" dirty="0" err="1">
+                <a:latin typeface="Consolas" panose="020B0609020204030204" pitchFamily="49" charset="0"/>
+              </a:rPr>
+              <a:t>inference_model.json</a:t>
+            </a:r>
+            <a:r>
+              <a:rPr lang="en-US" altLang="zh-CN" sz="1200" dirty="0"/>
+              <a:t> file.</a:t>
+            </a:r>
+          </a:p>
+          <a:p>
+            <a:pPr marL="171450" indent="-171450">
+              <a:buFont typeface="Arial" panose="020B0604020202020204" pitchFamily="34" charset="0"/>
+              <a:buChar char="•"/>
+            </a:pPr>
+            <a:r>
+              <a:rPr lang="en-US" altLang="zh-CN" sz="1200" b="1" dirty="0"/>
+              <a:t>Tokenizer related configurations</a:t>
+            </a:r>
+            <a:br>
+              <a:rPr lang="en-US" altLang="zh-CN" sz="1200" b="1" dirty="0"/>
+            </a:br>
+            <a:r>
+              <a:rPr lang="en-US" altLang="zh-CN" sz="1200" dirty="0" err="1">
+                <a:latin typeface="Consolas" panose="020B0609020204030204" pitchFamily="49" charset="0"/>
+              </a:rPr>
+              <a:t>tokenizer.json</a:t>
+            </a:r>
+            <a:r>
+              <a:rPr lang="en-US" altLang="zh-CN" sz="1200" dirty="0"/>
+              <a:t> file and </a:t>
+            </a:r>
+            <a:r>
+              <a:rPr lang="en-US" altLang="zh-CN" sz="1200" dirty="0" err="1">
+                <a:latin typeface="Consolas" panose="020B0609020204030204" pitchFamily="49" charset="0"/>
+              </a:rPr>
+              <a:t>tokenizer_config.json</a:t>
+            </a:r>
+            <a:r>
+              <a:rPr lang="en-US" altLang="zh-CN" sz="1200" dirty="0"/>
+              <a:t> file, and </a:t>
+            </a:r>
+            <a:r>
+              <a:rPr lang="en-US" altLang="zh-CN" sz="1200" dirty="0" err="1">
+                <a:latin typeface="Consolas" panose="020B0609020204030204" pitchFamily="49" charset="0"/>
+              </a:rPr>
+              <a:t>special_tokens_map.json</a:t>
+            </a:r>
+            <a:r>
+              <a:rPr lang="en-US" altLang="zh-CN" sz="1200" dirty="0"/>
+              <a:t> file that may exist.</a:t>
+            </a:r>
+          </a:p>
+          <a:p>
+            <a:pPr marL="171450" indent="-171450">
+              <a:buFont typeface="Arial" panose="020B0604020202020204" pitchFamily="34" charset="0"/>
+              <a:buChar char="•"/>
+            </a:pPr>
+            <a:r>
+              <a:rPr lang="en-US" altLang="zh-CN" sz="1200" b="1" dirty="0"/>
+              <a:t>Glossary files</a:t>
+            </a:r>
+            <a:br>
+              <a:rPr lang="en-US" altLang="zh-CN" sz="1200" b="1" dirty="0"/>
+            </a:br>
+            <a:r>
+              <a:rPr lang="en-US" altLang="zh-CN" sz="1200" dirty="0">
+                <a:latin typeface="Consolas" panose="020B0609020204030204" pitchFamily="49" charset="0"/>
+              </a:rPr>
+              <a:t>merges.txt</a:t>
+            </a:r>
+            <a:r>
+              <a:rPr lang="en-US" altLang="zh-CN" sz="1200" dirty="0"/>
+              <a:t> files; some may be </a:t>
+            </a:r>
+            <a:r>
+              <a:rPr lang="en-US" altLang="zh-CN" sz="1200" dirty="0">
+                <a:latin typeface="Consolas" panose="020B0609020204030204" pitchFamily="49" charset="0"/>
+              </a:rPr>
+              <a:t>vocab.txt</a:t>
+            </a:r>
+            <a:r>
+              <a:rPr lang="en-US" altLang="zh-CN" sz="1200" dirty="0"/>
+              <a:t> file or </a:t>
+            </a:r>
+            <a:r>
+              <a:rPr lang="en-US" altLang="zh-CN" sz="1200" dirty="0" err="1">
+                <a:latin typeface="Consolas" panose="020B0609020204030204" pitchFamily="49" charset="0"/>
+              </a:rPr>
+              <a:t>vocab.json</a:t>
+            </a:r>
+            <a:r>
+              <a:rPr lang="en-US" altLang="zh-CN" sz="1200" dirty="0"/>
+              <a:t> file; and some models will also contain additional file </a:t>
+            </a:r>
+            <a:r>
+              <a:rPr lang="en-US" altLang="zh-CN" sz="1200" dirty="0" err="1">
+                <a:latin typeface="Consolas" panose="020B0609020204030204" pitchFamily="49" charset="0"/>
+              </a:rPr>
+              <a:t>added_tokens.json</a:t>
+            </a:r>
+            <a:r>
+              <a:rPr lang="en-US" altLang="zh-CN" sz="1200" dirty="0"/>
+              <a:t>.</a:t>
+            </a:r>
+          </a:p>
+          <a:p>
+            <a:pPr marL="171450" indent="-171450">
+              <a:buFont typeface="Arial" panose="020B0604020202020204" pitchFamily="34" charset="0"/>
+              <a:buChar char="•"/>
+            </a:pPr>
+            <a:r>
+              <a:rPr lang="en-US" altLang="zh-CN" sz="1200" b="1" dirty="0"/>
+              <a:t>Other</a:t>
+            </a:r>
+            <a:r>
+              <a:rPr lang="en-US" altLang="zh-CN" sz="1200" dirty="0"/>
+              <a:t> supporting files.</a:t>
+            </a:r>
+            <a:endParaRPr lang="zh-CN" altLang="en-US" sz="1200" dirty="0"/>
+          </a:p>
+        </p:txBody>
+      </p:sp>
+      <p:sp>
+        <p:nvSpPr>
+          <p:cNvPr id="3" name="标题 2">
+            <a:extLst>
+              <a:ext uri="{FF2B5EF4-FFF2-40B4-BE49-F238E27FC236}">
+                <a16:creationId xmlns:a16="http://schemas.microsoft.com/office/drawing/2014/main" id="{2B771041-E76C-74F7-BB2D-68BB2DC3EBB8}"/>
+              </a:ext>
+            </a:extLst>
+          </p:cNvPr>
+          <p:cNvSpPr>
+            <a:spLocks noGrp="1" noRot="1" noMove="1" noResize="1" noEditPoints="1" noAdjustHandles="1" noChangeArrowheads="1" noChangeShapeType="1"/>
+          </p:cNvSpPr>
+          <p:nvPr>
+            <p:ph type="title" idx="4294967295"/>
+          </p:nvPr>
+        </p:nvSpPr>
+        <p:spPr>
+          <a:xfrm>
+            <a:off x="695325" y="406400"/>
+            <a:ext cx="10801350" cy="720000"/>
+          </a:xfrm>
+        </p:spPr>
+        <p:txBody>
+          <a:bodyPr>
+            <a:normAutofit/>
+          </a:bodyPr>
+          <a:lstStyle/>
+          <a:p>
+            <a:r>
+              <a:rPr lang="en-US" altLang="zh-CN" sz="3200" dirty="0">
+                <a:solidFill>
+                  <a:schemeClr val="tx1">
+                    <a:lumMod val="50000"/>
+                  </a:schemeClr>
+                </a:solidFill>
+              </a:rPr>
+              <a:t>Models</a:t>
+            </a:r>
+            <a:endParaRPr lang="zh-CN" altLang="en-US" sz="3200" dirty="0">
+              <a:solidFill>
+                <a:schemeClr val="tx1">
+                  <a:lumMod val="50000"/>
+                </a:schemeClr>
+              </a:solidFill>
+            </a:endParaRPr>
+          </a:p>
+        </p:txBody>
+      </p:sp>
+      <p:sp>
+        <p:nvSpPr>
+          <p:cNvPr id="72" name="矩形 71">
+            <a:extLst>
+              <a:ext uri="{FF2B5EF4-FFF2-40B4-BE49-F238E27FC236}">
+                <a16:creationId xmlns:a16="http://schemas.microsoft.com/office/drawing/2014/main" id="{3EE3DEF7-5CC7-5632-D740-7FB09DC4D2FB}"/>
+              </a:ext>
+            </a:extLst>
+          </p:cNvPr>
+          <p:cNvSpPr>
+            <a:spLocks noGrp="1" noRot="1" noMove="1" noResize="1" noEditPoints="1" noAdjustHandles="1" noChangeArrowheads="1" noChangeShapeType="1"/>
+          </p:cNvSpPr>
+          <p:nvPr/>
+        </p:nvSpPr>
+        <p:spPr>
+          <a:xfrm>
+            <a:off x="3552000" y="637074"/>
+            <a:ext cx="8640000" cy="287358"/>
+          </a:xfrm>
+          <a:prstGeom prst="rect">
+            <a:avLst/>
+          </a:prstGeom>
+          <a:pattFill prst="wdUpDiag">
+            <a:fgClr>
+              <a:schemeClr val="bg1">
+                <a:lumMod val="95000"/>
+                <a:lumOff val="5000"/>
+              </a:schemeClr>
+            </a:fgClr>
+            <a:bgClr>
+              <a:schemeClr val="bg1">
+                <a:lumMod val="85000"/>
+                <a:lumOff val="15000"/>
+              </a:schemeClr>
+            </a:bgClr>
+          </a:pattFill>
+          <a:ln>
+            <a:noFill/>
+          </a:ln>
+        </p:spPr>
+        <p:style>
+          <a:lnRef idx="2">
+            <a:schemeClr val="accent1">
+              <a:shade val="15000"/>
+            </a:schemeClr>
+          </a:lnRef>
+          <a:fillRef idx="1">
+            <a:schemeClr val="accent1"/>
+          </a:fillRef>
+          <a:effectRef idx="0">
+            <a:schemeClr val="accent1"/>
+          </a:effectRef>
+          <a:fontRef idx="minor">
+            <a:schemeClr val="lt1"/>
+          </a:fontRef>
+        </p:style>
+        <p:txBody>
+          <a:bodyPr rtlCol="0" anchor="ctr"/>
+          <a:lstStyle/>
+          <a:p>
+            <a:pPr algn="ctr"/>
+            <a:endParaRPr lang="zh-CN" altLang="en-US"/>
+          </a:p>
+        </p:txBody>
+      </p:sp>
+      <p:sp>
+        <p:nvSpPr>
+          <p:cNvPr id="5" name="矩形 4">
+            <a:extLst>
+              <a:ext uri="{FF2B5EF4-FFF2-40B4-BE49-F238E27FC236}">
+                <a16:creationId xmlns:a16="http://schemas.microsoft.com/office/drawing/2014/main" id="{73D0F60F-2A2A-B24B-15A2-E245DE09D15D}"/>
+              </a:ext>
+            </a:extLst>
+          </p:cNvPr>
+          <p:cNvSpPr/>
+          <p:nvPr/>
+        </p:nvSpPr>
+        <p:spPr>
+          <a:xfrm>
+            <a:off x="1559322" y="1270400"/>
+            <a:ext cx="3600000" cy="360000"/>
+          </a:xfrm>
+          <a:prstGeom prst="rect">
+            <a:avLst/>
+          </a:prstGeom>
+          <a:solidFill>
+            <a:schemeClr val="bg1">
+              <a:lumMod val="85000"/>
+              <a:lumOff val="15000"/>
+            </a:schemeClr>
+          </a:solidFill>
+          <a:ln>
+            <a:noFill/>
+          </a:ln>
+        </p:spPr>
+        <p:style>
+          <a:lnRef idx="2">
+            <a:schemeClr val="accent1">
+              <a:shade val="15000"/>
+            </a:schemeClr>
+          </a:lnRef>
+          <a:fillRef idx="1">
+            <a:schemeClr val="accent1"/>
+          </a:fillRef>
+          <a:effectRef idx="0">
+            <a:schemeClr val="accent1"/>
+          </a:effectRef>
+          <a:fontRef idx="minor">
+            <a:schemeClr val="lt1"/>
+          </a:fontRef>
+        </p:style>
+        <p:txBody>
+          <a:bodyPr rtlCol="0" anchor="ctr"/>
+          <a:lstStyle/>
+          <a:p>
+            <a:pPr algn="ctr"/>
+            <a:r>
+              <a:rPr lang="en-US" altLang="zh-CN" sz="1400" dirty="0"/>
+              <a:t>Cloud</a:t>
+            </a:r>
+            <a:endParaRPr lang="zh-CN" altLang="en-US" sz="1400" dirty="0"/>
+          </a:p>
+        </p:txBody>
+      </p:sp>
+      <p:sp>
+        <p:nvSpPr>
+          <p:cNvPr id="17" name="矩形 16">
+            <a:extLst>
+              <a:ext uri="{FF2B5EF4-FFF2-40B4-BE49-F238E27FC236}">
+                <a16:creationId xmlns:a16="http://schemas.microsoft.com/office/drawing/2014/main" id="{681672BE-474C-EA88-DCC1-FE7AE873B634}"/>
+              </a:ext>
+            </a:extLst>
+          </p:cNvPr>
+          <p:cNvSpPr/>
+          <p:nvPr/>
+        </p:nvSpPr>
+        <p:spPr>
+          <a:xfrm>
+            <a:off x="7032680" y="1270400"/>
+            <a:ext cx="3600000" cy="360000"/>
+          </a:xfrm>
+          <a:prstGeom prst="rect">
+            <a:avLst/>
+          </a:prstGeom>
+          <a:solidFill>
+            <a:schemeClr val="bg1">
+              <a:lumMod val="85000"/>
+              <a:lumOff val="15000"/>
+            </a:schemeClr>
+          </a:solidFill>
+          <a:ln>
+            <a:noFill/>
+          </a:ln>
+        </p:spPr>
+        <p:style>
+          <a:lnRef idx="2">
+            <a:schemeClr val="accent1">
+              <a:shade val="15000"/>
+            </a:schemeClr>
+          </a:lnRef>
+          <a:fillRef idx="1">
+            <a:schemeClr val="accent1"/>
+          </a:fillRef>
+          <a:effectRef idx="0">
+            <a:schemeClr val="accent1"/>
+          </a:effectRef>
+          <a:fontRef idx="minor">
+            <a:schemeClr val="lt1"/>
+          </a:fontRef>
+        </p:style>
+        <p:txBody>
+          <a:bodyPr rtlCol="0" anchor="ctr"/>
+          <a:lstStyle/>
+          <a:p>
+            <a:pPr algn="ctr"/>
+            <a:r>
+              <a:rPr lang="en-US" altLang="zh-CN" sz="1400" dirty="0"/>
+              <a:t>Local</a:t>
+            </a:r>
+            <a:endParaRPr lang="zh-CN" altLang="en-US" sz="1400" dirty="0"/>
+          </a:p>
+        </p:txBody>
+      </p:sp>
+      <p:sp>
+        <p:nvSpPr>
+          <p:cNvPr id="19" name="矩形: 圆角 18">
+            <a:extLst>
+              <a:ext uri="{FF2B5EF4-FFF2-40B4-BE49-F238E27FC236}">
+                <a16:creationId xmlns:a16="http://schemas.microsoft.com/office/drawing/2014/main" id="{56E43648-267B-C449-5F60-D3D8969DA520}"/>
+              </a:ext>
+            </a:extLst>
+          </p:cNvPr>
+          <p:cNvSpPr/>
+          <p:nvPr/>
+        </p:nvSpPr>
+        <p:spPr>
+          <a:xfrm>
+            <a:off x="695322" y="1630400"/>
+            <a:ext cx="5328000" cy="432000"/>
+          </a:xfrm>
+          <a:prstGeom prst="roundRect">
+            <a:avLst/>
+          </a:prstGeom>
+        </p:spPr>
+        <p:style>
+          <a:lnRef idx="2">
+            <a:schemeClr val="accent1">
+              <a:shade val="15000"/>
+            </a:schemeClr>
+          </a:lnRef>
+          <a:fillRef idx="1">
+            <a:schemeClr val="accent1"/>
+          </a:fillRef>
+          <a:effectRef idx="0">
+            <a:schemeClr val="accent1"/>
+          </a:effectRef>
+          <a:fontRef idx="minor">
+            <a:schemeClr val="lt1"/>
+          </a:fontRef>
+        </p:style>
+        <p:txBody>
+          <a:bodyPr rtlCol="0" anchor="ctr"/>
+          <a:lstStyle/>
+          <a:p>
+            <a:pPr algn="ctr"/>
+            <a:r>
+              <a:rPr lang="en-US" altLang="zh-CN" sz="1600" dirty="0"/>
+              <a:t>List &amp; get info (manifest)</a:t>
+            </a:r>
+            <a:endParaRPr lang="zh-CN" altLang="en-US" sz="1600" dirty="0"/>
+          </a:p>
+        </p:txBody>
+      </p:sp>
+      <p:sp>
+        <p:nvSpPr>
+          <p:cNvPr id="20" name="矩形: 圆角 19">
+            <a:extLst>
+              <a:ext uri="{FF2B5EF4-FFF2-40B4-BE49-F238E27FC236}">
+                <a16:creationId xmlns:a16="http://schemas.microsoft.com/office/drawing/2014/main" id="{51CFE270-22CB-04C5-2E15-6CE8BC3D11C0}"/>
+              </a:ext>
+            </a:extLst>
+          </p:cNvPr>
+          <p:cNvSpPr/>
+          <p:nvPr/>
+        </p:nvSpPr>
+        <p:spPr>
+          <a:xfrm>
+            <a:off x="6168678" y="1630400"/>
+            <a:ext cx="5328000" cy="432000"/>
+          </a:xfrm>
+          <a:prstGeom prst="roundRect">
+            <a:avLst/>
+          </a:prstGeom>
+        </p:spPr>
+        <p:style>
+          <a:lnRef idx="2">
+            <a:schemeClr val="accent1">
+              <a:shade val="15000"/>
+            </a:schemeClr>
+          </a:lnRef>
+          <a:fillRef idx="1">
+            <a:schemeClr val="accent1"/>
+          </a:fillRef>
+          <a:effectRef idx="0">
+            <a:schemeClr val="accent1"/>
+          </a:effectRef>
+          <a:fontRef idx="minor">
+            <a:schemeClr val="lt1"/>
+          </a:fontRef>
+        </p:style>
+        <p:txBody>
+          <a:bodyPr lIns="216000" rIns="216000" rtlCol="0" anchor="ctr"/>
+          <a:lstStyle/>
+          <a:p>
+            <a:r>
+              <a:rPr lang="en-US" altLang="zh-CN" sz="1600" dirty="0"/>
+              <a:t>Cache</a:t>
+            </a:r>
+            <a:endParaRPr lang="zh-CN" altLang="en-US" sz="1600" dirty="0"/>
+          </a:p>
+        </p:txBody>
+      </p:sp>
+      <p:pic>
+        <p:nvPicPr>
+          <p:cNvPr id="23" name="图形 22" descr="文件夹 纯色填充">
+            <a:extLst>
+              <a:ext uri="{FF2B5EF4-FFF2-40B4-BE49-F238E27FC236}">
+                <a16:creationId xmlns:a16="http://schemas.microsoft.com/office/drawing/2014/main" id="{39601A28-9D99-75E2-1F93-E61AD9C2D012}"/>
+              </a:ext>
+            </a:extLst>
+          </p:cNvPr>
+          <p:cNvPicPr>
+            <a:picLocks noChangeAspect="1"/>
+          </p:cNvPicPr>
+          <p:nvPr/>
+        </p:nvPicPr>
+        <p:blipFill>
+          <a:blip r:embed="rId2">
+            <a:extLst>
+              <a:ext uri="{96DAC541-7B7A-43D3-8B79-37D633B846F1}">
+                <asvg:svgBlip xmlns:asvg="http://schemas.microsoft.com/office/drawing/2016/SVG/main" r:embed="rId3"/>
+              </a:ext>
+            </a:extLst>
+          </a:blip>
+          <a:stretch>
+            <a:fillRect/>
+          </a:stretch>
+        </p:blipFill>
+        <p:spPr>
+          <a:xfrm>
+            <a:off x="6318806" y="2939873"/>
+            <a:ext cx="288000" cy="288000"/>
+          </a:xfrm>
+          <a:prstGeom prst="rect">
+            <a:avLst/>
+          </a:prstGeom>
+        </p:spPr>
+      </p:pic>
+      <p:pic>
+        <p:nvPicPr>
+          <p:cNvPr id="26" name="图形 25" descr="文件夹 纯色填充">
+            <a:extLst>
+              <a:ext uri="{FF2B5EF4-FFF2-40B4-BE49-F238E27FC236}">
+                <a16:creationId xmlns:a16="http://schemas.microsoft.com/office/drawing/2014/main" id="{86343AE1-BBD7-93EC-4AFE-33D601258F67}"/>
+              </a:ext>
+            </a:extLst>
+          </p:cNvPr>
+          <p:cNvPicPr>
+            <a:picLocks noChangeAspect="1"/>
+          </p:cNvPicPr>
+          <p:nvPr/>
+        </p:nvPicPr>
+        <p:blipFill>
+          <a:blip r:embed="rId2">
+            <a:extLst>
+              <a:ext uri="{96DAC541-7B7A-43D3-8B79-37D633B846F1}">
+                <asvg:svgBlip xmlns:asvg="http://schemas.microsoft.com/office/drawing/2016/SVG/main" r:embed="rId3"/>
+              </a:ext>
+            </a:extLst>
+          </a:blip>
+          <a:stretch>
+            <a:fillRect/>
+          </a:stretch>
+        </p:blipFill>
+        <p:spPr>
+          <a:xfrm>
+            <a:off x="6325633" y="3298271"/>
+            <a:ext cx="288000" cy="288000"/>
+          </a:xfrm>
+          <a:prstGeom prst="rect">
+            <a:avLst/>
+          </a:prstGeom>
+        </p:spPr>
+      </p:pic>
+      <p:sp>
+        <p:nvSpPr>
+          <p:cNvPr id="29" name="文本框 28">
+            <a:extLst>
+              <a:ext uri="{FF2B5EF4-FFF2-40B4-BE49-F238E27FC236}">
+                <a16:creationId xmlns:a16="http://schemas.microsoft.com/office/drawing/2014/main" id="{A1EA55E6-0845-B5CF-E369-90212E6E4A7F}"/>
+              </a:ext>
+            </a:extLst>
+          </p:cNvPr>
+          <p:cNvSpPr txBox="1"/>
+          <p:nvPr/>
+        </p:nvSpPr>
+        <p:spPr>
+          <a:xfrm>
+            <a:off x="6168679" y="2134400"/>
+            <a:ext cx="5327996" cy="523220"/>
+          </a:xfrm>
+          <a:prstGeom prst="rect">
+            <a:avLst/>
+          </a:prstGeom>
+          <a:noFill/>
+        </p:spPr>
+        <p:txBody>
+          <a:bodyPr wrap="square">
+            <a:spAutoFit/>
+          </a:bodyPr>
+          <a:lstStyle/>
+          <a:p>
+            <a:r>
+              <a:rPr lang="en-US" altLang="zh-CN" sz="1400" dirty="0"/>
+              <a:t>The cache directory contains models and may have one or more layers of folders, one of which is named by its model ID.</a:t>
+            </a:r>
+            <a:endParaRPr lang="zh-CN" altLang="en-US" sz="1400" dirty="0"/>
+          </a:p>
+        </p:txBody>
+      </p:sp>
+      <p:pic>
+        <p:nvPicPr>
+          <p:cNvPr id="30" name="图形 29" descr="打开文件夹 纯色填充">
+            <a:extLst>
+              <a:ext uri="{FF2B5EF4-FFF2-40B4-BE49-F238E27FC236}">
+                <a16:creationId xmlns:a16="http://schemas.microsoft.com/office/drawing/2014/main" id="{078F4098-3844-A658-6350-49E35A3D6F85}"/>
+              </a:ext>
+            </a:extLst>
+          </p:cNvPr>
+          <p:cNvPicPr>
+            <a:picLocks noChangeAspect="1"/>
+          </p:cNvPicPr>
+          <p:nvPr/>
+        </p:nvPicPr>
+        <p:blipFill>
+          <a:blip r:embed="rId4">
+            <a:extLst>
+              <a:ext uri="{96DAC541-7B7A-43D3-8B79-37D633B846F1}">
+                <asvg:svgBlip xmlns:asvg="http://schemas.microsoft.com/office/drawing/2016/SVG/main" r:embed="rId5"/>
+              </a:ext>
+            </a:extLst>
+          </a:blip>
+          <a:srcRect/>
+          <a:stretch/>
+        </p:blipFill>
+        <p:spPr>
+          <a:xfrm>
+            <a:off x="6318806" y="4007562"/>
+            <a:ext cx="288000" cy="288000"/>
+          </a:xfrm>
+          <a:prstGeom prst="rect">
+            <a:avLst/>
+          </a:prstGeom>
+        </p:spPr>
+      </p:pic>
+      <p:sp>
+        <p:nvSpPr>
+          <p:cNvPr id="35" name="流程图: 磁盘 34">
+            <a:extLst>
+              <a:ext uri="{FF2B5EF4-FFF2-40B4-BE49-F238E27FC236}">
+                <a16:creationId xmlns:a16="http://schemas.microsoft.com/office/drawing/2014/main" id="{1B46C63C-D503-6E60-8E49-193522DC16FE}"/>
+              </a:ext>
+            </a:extLst>
+          </p:cNvPr>
+          <p:cNvSpPr/>
+          <p:nvPr/>
+        </p:nvSpPr>
+        <p:spPr>
+          <a:xfrm>
+            <a:off x="10847436" y="6220926"/>
+            <a:ext cx="432000" cy="360000"/>
+          </a:xfrm>
+          <a:prstGeom prst="flowChartMagneticDisk">
+            <a:avLst/>
+          </a:prstGeom>
+          <a:solidFill>
+            <a:schemeClr val="accent3"/>
+          </a:solidFill>
+          <a:ln>
+            <a:solidFill>
+              <a:schemeClr val="bg1">
+                <a:lumMod val="95000"/>
+                <a:lumOff val="5000"/>
+              </a:schemeClr>
+            </a:solidFill>
+          </a:ln>
+        </p:spPr>
+        <p:style>
+          <a:lnRef idx="2">
+            <a:schemeClr val="accent4">
+              <a:shade val="15000"/>
+            </a:schemeClr>
+          </a:lnRef>
+          <a:fillRef idx="1">
+            <a:schemeClr val="accent4"/>
+          </a:fillRef>
+          <a:effectRef idx="0">
+            <a:schemeClr val="accent4"/>
+          </a:effectRef>
+          <a:fontRef idx="minor">
+            <a:schemeClr val="lt1"/>
+          </a:fontRef>
+        </p:style>
+        <p:txBody>
+          <a:bodyPr rtlCol="0" anchor="ctr"/>
+          <a:lstStyle/>
+          <a:p>
+            <a:pPr algn="ctr"/>
+            <a:endParaRPr lang="zh-CN" altLang="en-US" sz="1600" dirty="0"/>
+          </a:p>
+        </p:txBody>
+      </p:sp>
+      <p:cxnSp>
+        <p:nvCxnSpPr>
+          <p:cNvPr id="43" name="直接箭头连接符 42">
+            <a:extLst>
+              <a:ext uri="{FF2B5EF4-FFF2-40B4-BE49-F238E27FC236}">
+                <a16:creationId xmlns:a16="http://schemas.microsoft.com/office/drawing/2014/main" id="{DFD35066-1314-B088-5FE5-9BD5CE4BF685}"/>
+              </a:ext>
+            </a:extLst>
+          </p:cNvPr>
+          <p:cNvCxnSpPr>
+            <a:cxnSpLocks/>
+            <a:stCxn id="9" idx="3"/>
+          </p:cNvCxnSpPr>
+          <p:nvPr/>
+        </p:nvCxnSpPr>
+        <p:spPr>
+          <a:xfrm>
+            <a:off x="7362806" y="4148444"/>
+            <a:ext cx="893869" cy="0"/>
+          </a:xfrm>
+          <a:prstGeom prst="straightConnector1">
+            <a:avLst/>
+          </a:prstGeom>
+          <a:ln>
+            <a:solidFill>
+              <a:schemeClr val="tx1">
+                <a:lumMod val="75000"/>
+              </a:schemeClr>
+            </a:solidFill>
+            <a:tailEnd type="triangle"/>
+          </a:ln>
+        </p:spPr>
+        <p:style>
+          <a:lnRef idx="2">
+            <a:schemeClr val="accent1"/>
+          </a:lnRef>
+          <a:fillRef idx="0">
+            <a:schemeClr val="accent1"/>
+          </a:fillRef>
+          <a:effectRef idx="1">
+            <a:schemeClr val="accent1"/>
+          </a:effectRef>
+          <a:fontRef idx="minor">
+            <a:schemeClr val="tx1"/>
+          </a:fontRef>
+        </p:style>
+      </p:cxnSp>
+      <p:sp>
+        <p:nvSpPr>
+          <p:cNvPr id="54" name="矩形 53">
+            <a:extLst>
+              <a:ext uri="{FF2B5EF4-FFF2-40B4-BE49-F238E27FC236}">
+                <a16:creationId xmlns:a16="http://schemas.microsoft.com/office/drawing/2014/main" id="{4C92F474-E0B2-105D-ED53-FC3DE4A4B299}"/>
+              </a:ext>
+            </a:extLst>
+          </p:cNvPr>
+          <p:cNvSpPr/>
+          <p:nvPr/>
+        </p:nvSpPr>
+        <p:spPr>
+          <a:xfrm>
+            <a:off x="695322" y="4960926"/>
+            <a:ext cx="5328000" cy="1620000"/>
+          </a:xfrm>
+          <a:prstGeom prst="rect">
+            <a:avLst/>
+          </a:prstGeom>
+          <a:solidFill>
+            <a:srgbClr val="191919"/>
+          </a:solidFill>
+          <a:ln>
+            <a:solidFill>
+              <a:schemeClr val="bg1">
+                <a:lumMod val="85000"/>
+                <a:lumOff val="15000"/>
+              </a:schemeClr>
+            </a:solidFill>
+          </a:ln>
+        </p:spPr>
+        <p:style>
+          <a:lnRef idx="2">
+            <a:schemeClr val="accent1">
+              <a:shade val="15000"/>
+            </a:schemeClr>
+          </a:lnRef>
+          <a:fillRef idx="1">
+            <a:schemeClr val="accent1"/>
+          </a:fillRef>
+          <a:effectRef idx="0">
+            <a:schemeClr val="accent1"/>
+          </a:effectRef>
+          <a:fontRef idx="minor">
+            <a:schemeClr val="lt1"/>
+          </a:fontRef>
+        </p:style>
+        <p:txBody>
+          <a:bodyPr numCol="2" rtlCol="0" anchor="ctr"/>
+          <a:lstStyle/>
+          <a:p>
+            <a:r>
+              <a:rPr lang="en-US" altLang="zh-CN" sz="500" dirty="0">
+                <a:solidFill>
+                  <a:schemeClr val="tx1">
+                    <a:lumMod val="75000"/>
+                  </a:schemeClr>
+                </a:solidFill>
+                <a:latin typeface="Consolas" panose="020B0609020204030204" pitchFamily="49" charset="0"/>
+              </a:rPr>
+              <a:t>[</a:t>
+            </a:r>
+          </a:p>
+          <a:p>
+            <a:r>
+              <a:rPr lang="en-US" altLang="zh-CN" sz="500" dirty="0">
+                <a:solidFill>
+                  <a:schemeClr val="tx1">
+                    <a:lumMod val="75000"/>
+                  </a:schemeClr>
+                </a:solidFill>
+                <a:latin typeface="Consolas" panose="020B0609020204030204" pitchFamily="49" charset="0"/>
+              </a:rPr>
+              <a:t>  {</a:t>
+            </a:r>
+          </a:p>
+          <a:p>
+            <a:r>
+              <a:rPr lang="en-US" altLang="zh-CN" sz="500" dirty="0">
+                <a:solidFill>
+                  <a:schemeClr val="tx1">
+                    <a:lumMod val="75000"/>
+                  </a:schemeClr>
+                </a:solidFill>
+                <a:latin typeface="Consolas" panose="020B0609020204030204" pitchFamily="49" charset="0"/>
+              </a:rPr>
+              <a:t>    "name": "Phi-4-generic-gpu:1",</a:t>
+            </a:r>
+          </a:p>
+          <a:p>
+            <a:r>
+              <a:rPr lang="en-US" altLang="zh-CN" sz="500" dirty="0">
+                <a:solidFill>
+                  <a:schemeClr val="tx1">
+                    <a:lumMod val="75000"/>
+                  </a:schemeClr>
+                </a:solidFill>
+                <a:latin typeface="Consolas" panose="020B0609020204030204" pitchFamily="49" charset="0"/>
+              </a:rPr>
+              <a:t>    "</a:t>
+            </a:r>
+            <a:r>
+              <a:rPr lang="en-US" altLang="zh-CN" sz="500" dirty="0" err="1">
+                <a:solidFill>
+                  <a:schemeClr val="tx1">
+                    <a:lumMod val="75000"/>
+                  </a:schemeClr>
+                </a:solidFill>
+                <a:latin typeface="Consolas" panose="020B0609020204030204" pitchFamily="49" charset="0"/>
+              </a:rPr>
+              <a:t>displayName</a:t>
+            </a:r>
+            <a:r>
+              <a:rPr lang="en-US" altLang="zh-CN" sz="500" dirty="0">
+                <a:solidFill>
+                  <a:schemeClr val="tx1">
+                    <a:lumMod val="75000"/>
+                  </a:schemeClr>
+                </a:solidFill>
+                <a:latin typeface="Consolas" panose="020B0609020204030204" pitchFamily="49" charset="0"/>
+              </a:rPr>
+              <a:t>": "Phi-4-generic-gpu",</a:t>
+            </a:r>
+          </a:p>
+          <a:p>
+            <a:r>
+              <a:rPr lang="en-US" altLang="zh-CN" sz="500" dirty="0">
+                <a:solidFill>
+                  <a:schemeClr val="tx1">
+                    <a:lumMod val="75000"/>
+                  </a:schemeClr>
+                </a:solidFill>
+                <a:latin typeface="Consolas" panose="020B0609020204030204" pitchFamily="49" charset="0"/>
+              </a:rPr>
+              <a:t>    "</a:t>
+            </a:r>
+            <a:r>
+              <a:rPr lang="en-US" altLang="zh-CN" sz="500" dirty="0" err="1">
+                <a:solidFill>
+                  <a:schemeClr val="tx1">
+                    <a:lumMod val="75000"/>
+                  </a:schemeClr>
+                </a:solidFill>
+                <a:latin typeface="Consolas" panose="020B0609020204030204" pitchFamily="49" charset="0"/>
+              </a:rPr>
+              <a:t>providerType</a:t>
+            </a:r>
+            <a:r>
+              <a:rPr lang="en-US" altLang="zh-CN" sz="500" dirty="0">
+                <a:solidFill>
+                  <a:schemeClr val="tx1">
+                    <a:lumMod val="75000"/>
+                  </a:schemeClr>
+                </a:solidFill>
+                <a:latin typeface="Consolas" panose="020B0609020204030204" pitchFamily="49" charset="0"/>
+              </a:rPr>
+              <a:t>": "</a:t>
+            </a:r>
+            <a:r>
+              <a:rPr lang="en-US" altLang="zh-CN" sz="500" dirty="0" err="1">
+                <a:solidFill>
+                  <a:schemeClr val="tx1">
+                    <a:lumMod val="75000"/>
+                  </a:schemeClr>
+                </a:solidFill>
+                <a:latin typeface="Consolas" panose="020B0609020204030204" pitchFamily="49" charset="0"/>
+              </a:rPr>
+              <a:t>AzureFoundry</a:t>
+            </a:r>
+            <a:r>
+              <a:rPr lang="en-US" altLang="zh-CN" sz="500" dirty="0">
+                <a:solidFill>
+                  <a:schemeClr val="tx1">
+                    <a:lumMod val="75000"/>
+                  </a:schemeClr>
+                </a:solidFill>
+                <a:latin typeface="Consolas" panose="020B0609020204030204" pitchFamily="49" charset="0"/>
+              </a:rPr>
+              <a:t>",</a:t>
+            </a:r>
+          </a:p>
+          <a:p>
+            <a:r>
+              <a:rPr lang="en-US" altLang="zh-CN" sz="500" dirty="0">
+                <a:solidFill>
+                  <a:schemeClr val="tx1">
+                    <a:lumMod val="75000"/>
+                  </a:schemeClr>
+                </a:solidFill>
+                <a:latin typeface="Consolas" panose="020B0609020204030204" pitchFamily="49" charset="0"/>
+              </a:rPr>
+              <a:t>    "</a:t>
+            </a:r>
+            <a:r>
+              <a:rPr lang="en-US" altLang="zh-CN" sz="500" dirty="0" err="1">
+                <a:solidFill>
+                  <a:schemeClr val="tx1">
+                    <a:lumMod val="75000"/>
+                  </a:schemeClr>
+                </a:solidFill>
+                <a:latin typeface="Consolas" panose="020B0609020204030204" pitchFamily="49" charset="0"/>
+              </a:rPr>
+              <a:t>uri</a:t>
+            </a:r>
+            <a:r>
+              <a:rPr lang="en-US" altLang="zh-CN" sz="500" dirty="0">
+                <a:solidFill>
+                  <a:schemeClr val="tx1">
+                    <a:lumMod val="75000"/>
+                  </a:schemeClr>
+                </a:solidFill>
+                <a:latin typeface="Consolas" panose="020B0609020204030204" pitchFamily="49" charset="0"/>
+              </a:rPr>
+              <a:t>": "</a:t>
+            </a:r>
+            <a:r>
+              <a:rPr lang="en-US" altLang="zh-CN" sz="500" dirty="0" err="1">
+                <a:solidFill>
+                  <a:schemeClr val="tx1">
+                    <a:lumMod val="75000"/>
+                  </a:schemeClr>
+                </a:solidFill>
+                <a:latin typeface="Consolas" panose="020B0609020204030204" pitchFamily="49" charset="0"/>
+              </a:rPr>
+              <a:t>azureml</a:t>
+            </a:r>
+            <a:r>
+              <a:rPr lang="en-US" altLang="zh-CN" sz="500" dirty="0">
+                <a:solidFill>
+                  <a:schemeClr val="tx1">
+                    <a:lumMod val="75000"/>
+                  </a:schemeClr>
+                </a:solidFill>
+                <a:latin typeface="Consolas" panose="020B0609020204030204" pitchFamily="49" charset="0"/>
+              </a:rPr>
+              <a:t>://registries/</a:t>
+            </a:r>
+            <a:r>
+              <a:rPr lang="en-US" altLang="zh-CN" sz="500" dirty="0" err="1">
+                <a:solidFill>
+                  <a:schemeClr val="tx1">
+                    <a:lumMod val="75000"/>
+                  </a:schemeClr>
+                </a:solidFill>
+                <a:latin typeface="Consolas" panose="020B0609020204030204" pitchFamily="49" charset="0"/>
+              </a:rPr>
+              <a:t>azureml</a:t>
+            </a:r>
+            <a:r>
+              <a:rPr lang="en-US" altLang="zh-CN" sz="500" dirty="0">
+                <a:solidFill>
+                  <a:schemeClr val="tx1">
+                    <a:lumMod val="75000"/>
+                  </a:schemeClr>
+                </a:solidFill>
+                <a:latin typeface="Consolas" panose="020B0609020204030204" pitchFamily="49" charset="0"/>
+              </a:rPr>
+              <a:t>/models/Phi-4-generic-gpu/versions/1",</a:t>
+            </a:r>
+          </a:p>
+          <a:p>
+            <a:r>
+              <a:rPr lang="en-US" altLang="zh-CN" sz="500" dirty="0">
+                <a:solidFill>
+                  <a:schemeClr val="tx1">
+                    <a:lumMod val="75000"/>
+                  </a:schemeClr>
+                </a:solidFill>
+                <a:latin typeface="Consolas" panose="020B0609020204030204" pitchFamily="49" charset="0"/>
+              </a:rPr>
+              <a:t>    "version": "1",</a:t>
+            </a:r>
+          </a:p>
+          <a:p>
+            <a:r>
+              <a:rPr lang="en-US" altLang="zh-CN" sz="500" dirty="0">
+                <a:solidFill>
+                  <a:schemeClr val="tx1">
+                    <a:lumMod val="75000"/>
+                  </a:schemeClr>
+                </a:solidFill>
+                <a:latin typeface="Consolas" panose="020B0609020204030204" pitchFamily="49" charset="0"/>
+              </a:rPr>
+              <a:t>    "</a:t>
+            </a:r>
+            <a:r>
+              <a:rPr lang="en-US" altLang="zh-CN" sz="500" dirty="0" err="1">
+                <a:solidFill>
+                  <a:schemeClr val="tx1">
+                    <a:lumMod val="75000"/>
+                  </a:schemeClr>
+                </a:solidFill>
+                <a:latin typeface="Consolas" panose="020B0609020204030204" pitchFamily="49" charset="0"/>
+              </a:rPr>
+              <a:t>modelType</a:t>
+            </a:r>
+            <a:r>
+              <a:rPr lang="en-US" altLang="zh-CN" sz="500" dirty="0">
+                <a:solidFill>
+                  <a:schemeClr val="tx1">
+                    <a:lumMod val="75000"/>
+                  </a:schemeClr>
+                </a:solidFill>
+                <a:latin typeface="Consolas" panose="020B0609020204030204" pitchFamily="49" charset="0"/>
+              </a:rPr>
+              <a:t>": "ONNX",</a:t>
+            </a:r>
+          </a:p>
+          <a:p>
+            <a:r>
+              <a:rPr lang="en-US" altLang="zh-CN" sz="500" dirty="0">
+                <a:solidFill>
+                  <a:schemeClr val="tx1">
+                    <a:lumMod val="75000"/>
+                  </a:schemeClr>
+                </a:solidFill>
+                <a:latin typeface="Consolas" panose="020B0609020204030204" pitchFamily="49" charset="0"/>
+              </a:rPr>
+              <a:t>    "</a:t>
+            </a:r>
+            <a:r>
+              <a:rPr lang="en-US" altLang="zh-CN" sz="500" dirty="0" err="1">
+                <a:solidFill>
+                  <a:schemeClr val="tx1">
+                    <a:lumMod val="75000"/>
+                  </a:schemeClr>
+                </a:solidFill>
+                <a:latin typeface="Consolas" panose="020B0609020204030204" pitchFamily="49" charset="0"/>
+              </a:rPr>
+              <a:t>promptTemplate</a:t>
+            </a:r>
+            <a:r>
+              <a:rPr lang="en-US" altLang="zh-CN" sz="500" dirty="0">
+                <a:solidFill>
+                  <a:schemeClr val="tx1">
+                    <a:lumMod val="75000"/>
+                  </a:schemeClr>
+                </a:solidFill>
+                <a:latin typeface="Consolas" panose="020B0609020204030204" pitchFamily="49" charset="0"/>
+              </a:rPr>
+              <a:t>": {</a:t>
+            </a:r>
+          </a:p>
+          <a:p>
+            <a:r>
+              <a:rPr lang="en-US" altLang="zh-CN" sz="500" dirty="0">
+                <a:solidFill>
+                  <a:schemeClr val="tx1">
+                    <a:lumMod val="75000"/>
+                  </a:schemeClr>
+                </a:solidFill>
+                <a:latin typeface="Consolas" panose="020B0609020204030204" pitchFamily="49" charset="0"/>
+              </a:rPr>
+              <a:t>      "system": "&lt;|system|&gt; {Content}&lt;|</a:t>
+            </a:r>
+            <a:r>
+              <a:rPr lang="en-US" altLang="zh-CN" sz="500" dirty="0" err="1">
+                <a:solidFill>
+                  <a:schemeClr val="tx1">
+                    <a:lumMod val="75000"/>
+                  </a:schemeClr>
+                </a:solidFill>
+                <a:latin typeface="Consolas" panose="020B0609020204030204" pitchFamily="49" charset="0"/>
+              </a:rPr>
+              <a:t>im_end</a:t>
+            </a:r>
+            <a:r>
+              <a:rPr lang="en-US" altLang="zh-CN" sz="500" dirty="0">
+                <a:solidFill>
+                  <a:schemeClr val="tx1">
+                    <a:lumMod val="75000"/>
+                  </a:schemeClr>
+                </a:solidFill>
+                <a:latin typeface="Consolas" panose="020B0609020204030204" pitchFamily="49" charset="0"/>
+              </a:rPr>
+              <a:t>|&gt;",</a:t>
+            </a:r>
+          </a:p>
+          <a:p>
+            <a:r>
+              <a:rPr lang="en-US" altLang="zh-CN" sz="500" dirty="0">
+                <a:solidFill>
+                  <a:schemeClr val="tx1">
+                    <a:lumMod val="75000"/>
+                  </a:schemeClr>
+                </a:solidFill>
+                <a:latin typeface="Consolas" panose="020B0609020204030204" pitchFamily="49" charset="0"/>
+              </a:rPr>
+              <a:t>      "user": "&lt;|user|&gt; {Content}&lt;|</a:t>
+            </a:r>
+            <a:r>
+              <a:rPr lang="en-US" altLang="zh-CN" sz="500" dirty="0" err="1">
+                <a:solidFill>
+                  <a:schemeClr val="tx1">
+                    <a:lumMod val="75000"/>
+                  </a:schemeClr>
+                </a:solidFill>
+                <a:latin typeface="Consolas" panose="020B0609020204030204" pitchFamily="49" charset="0"/>
+              </a:rPr>
+              <a:t>im_end</a:t>
+            </a:r>
+            <a:r>
+              <a:rPr lang="en-US" altLang="zh-CN" sz="500" dirty="0">
+                <a:solidFill>
+                  <a:schemeClr val="tx1">
+                    <a:lumMod val="75000"/>
+                  </a:schemeClr>
+                </a:solidFill>
+                <a:latin typeface="Consolas" panose="020B0609020204030204" pitchFamily="49" charset="0"/>
+              </a:rPr>
+              <a:t>|&gt;",</a:t>
+            </a:r>
+          </a:p>
+          <a:p>
+            <a:r>
+              <a:rPr lang="en-US" altLang="zh-CN" sz="500" dirty="0">
+                <a:solidFill>
+                  <a:schemeClr val="tx1">
+                    <a:lumMod val="75000"/>
+                  </a:schemeClr>
+                </a:solidFill>
+                <a:latin typeface="Consolas" panose="020B0609020204030204" pitchFamily="49" charset="0"/>
+              </a:rPr>
+              <a:t>      "assistant": "&lt;|assistant|&gt; {Content}&lt;|</a:t>
+            </a:r>
+            <a:r>
+              <a:rPr lang="en-US" altLang="zh-CN" sz="500" dirty="0" err="1">
+                <a:solidFill>
+                  <a:schemeClr val="tx1">
+                    <a:lumMod val="75000"/>
+                  </a:schemeClr>
+                </a:solidFill>
+                <a:latin typeface="Consolas" panose="020B0609020204030204" pitchFamily="49" charset="0"/>
+              </a:rPr>
+              <a:t>im_end</a:t>
+            </a:r>
+            <a:r>
+              <a:rPr lang="en-US" altLang="zh-CN" sz="500" dirty="0">
+                <a:solidFill>
+                  <a:schemeClr val="tx1">
+                    <a:lumMod val="75000"/>
+                  </a:schemeClr>
+                </a:solidFill>
+                <a:latin typeface="Consolas" panose="020B0609020204030204" pitchFamily="49" charset="0"/>
+              </a:rPr>
+              <a:t>|&gt;",</a:t>
+            </a:r>
+          </a:p>
+          <a:p>
+            <a:r>
+              <a:rPr lang="en-US" altLang="zh-CN" sz="500" dirty="0">
+                <a:solidFill>
+                  <a:schemeClr val="tx1">
+                    <a:lumMod val="75000"/>
+                  </a:schemeClr>
+                </a:solidFill>
+                <a:latin typeface="Consolas" panose="020B0609020204030204" pitchFamily="49" charset="0"/>
+              </a:rPr>
+              <a:t>      "prompt": "&lt;|user|&gt; {Content}&lt;|</a:t>
+            </a:r>
+            <a:r>
+              <a:rPr lang="en-US" altLang="zh-CN" sz="500" dirty="0" err="1">
+                <a:solidFill>
+                  <a:schemeClr val="tx1">
+                    <a:lumMod val="75000"/>
+                  </a:schemeClr>
+                </a:solidFill>
+                <a:latin typeface="Consolas" panose="020B0609020204030204" pitchFamily="49" charset="0"/>
+              </a:rPr>
+              <a:t>im_end</a:t>
+            </a:r>
+            <a:r>
+              <a:rPr lang="en-US" altLang="zh-CN" sz="500" dirty="0">
+                <a:solidFill>
+                  <a:schemeClr val="tx1">
+                    <a:lumMod val="75000"/>
+                  </a:schemeClr>
+                </a:solidFill>
+                <a:latin typeface="Consolas" panose="020B0609020204030204" pitchFamily="49" charset="0"/>
+              </a:rPr>
+              <a:t>|&gt; &lt;|assistant|&gt;"</a:t>
+            </a:r>
+          </a:p>
+          <a:p>
+            <a:r>
+              <a:rPr lang="en-US" altLang="zh-CN" sz="500" dirty="0">
+                <a:solidFill>
+                  <a:schemeClr val="tx1">
+                    <a:lumMod val="75000"/>
+                  </a:schemeClr>
+                </a:solidFill>
+                <a:latin typeface="Consolas" panose="020B0609020204030204" pitchFamily="49" charset="0"/>
+              </a:rPr>
+              <a:t>    },</a:t>
+            </a:r>
+          </a:p>
+          <a:p>
+            <a:r>
+              <a:rPr lang="en-US" altLang="zh-CN" sz="500" dirty="0">
+                <a:solidFill>
+                  <a:schemeClr val="tx1">
+                    <a:lumMod val="75000"/>
+                  </a:schemeClr>
+                </a:solidFill>
+                <a:latin typeface="Consolas" panose="020B0609020204030204" pitchFamily="49" charset="0"/>
+              </a:rPr>
+              <a:t>    "publisher": "Microsoft",</a:t>
+            </a:r>
+          </a:p>
+          <a:p>
+            <a:r>
+              <a:rPr lang="en-US" altLang="zh-CN" sz="500" dirty="0">
+                <a:solidFill>
+                  <a:schemeClr val="tx1">
+                    <a:lumMod val="75000"/>
+                  </a:schemeClr>
+                </a:solidFill>
+                <a:latin typeface="Consolas" panose="020B0609020204030204" pitchFamily="49" charset="0"/>
+              </a:rPr>
+              <a:t>    "task": "chat-completion",</a:t>
+            </a:r>
+          </a:p>
+          <a:p>
+            <a:r>
+              <a:rPr lang="en-US" altLang="zh-CN" sz="500" dirty="0">
+                <a:solidFill>
+                  <a:schemeClr val="tx1">
+                    <a:lumMod val="75000"/>
+                  </a:schemeClr>
+                </a:solidFill>
+                <a:latin typeface="Consolas" panose="020B0609020204030204" pitchFamily="49" charset="0"/>
+              </a:rPr>
+              <a:t>    "</a:t>
+            </a:r>
+            <a:r>
+              <a:rPr lang="en-US" altLang="zh-CN" sz="500" dirty="0" err="1">
+                <a:solidFill>
+                  <a:schemeClr val="tx1">
+                    <a:lumMod val="75000"/>
+                  </a:schemeClr>
+                </a:solidFill>
+                <a:latin typeface="Consolas" panose="020B0609020204030204" pitchFamily="49" charset="0"/>
+              </a:rPr>
+              <a:t>testModel</a:t>
+            </a:r>
+            <a:r>
+              <a:rPr lang="en-US" altLang="zh-CN" sz="500" dirty="0">
+                <a:solidFill>
+                  <a:schemeClr val="tx1">
+                    <a:lumMod val="75000"/>
+                  </a:schemeClr>
+                </a:solidFill>
+                <a:latin typeface="Consolas" panose="020B0609020204030204" pitchFamily="49" charset="0"/>
+              </a:rPr>
+              <a:t>": false,</a:t>
+            </a:r>
+          </a:p>
+          <a:p>
+            <a:r>
+              <a:rPr lang="en-US" altLang="zh-CN" sz="500" dirty="0">
+                <a:solidFill>
+                  <a:schemeClr val="tx1">
+                    <a:lumMod val="75000"/>
+                  </a:schemeClr>
+                </a:solidFill>
+                <a:latin typeface="Consolas" panose="020B0609020204030204" pitchFamily="49" charset="0"/>
+              </a:rPr>
+              <a:t>    "runtime": {</a:t>
+            </a:r>
+          </a:p>
+          <a:p>
+            <a:r>
+              <a:rPr lang="en-US" altLang="zh-CN" sz="500" dirty="0">
+                <a:solidFill>
+                  <a:schemeClr val="tx1">
+                    <a:lumMod val="75000"/>
+                  </a:schemeClr>
+                </a:solidFill>
+                <a:latin typeface="Consolas" panose="020B0609020204030204" pitchFamily="49" charset="0"/>
+              </a:rPr>
+              <a:t>      "</a:t>
+            </a:r>
+            <a:r>
+              <a:rPr lang="en-US" altLang="zh-CN" sz="500" dirty="0" err="1">
+                <a:solidFill>
+                  <a:schemeClr val="tx1">
+                    <a:lumMod val="75000"/>
+                  </a:schemeClr>
+                </a:solidFill>
+                <a:latin typeface="Consolas" panose="020B0609020204030204" pitchFamily="49" charset="0"/>
+              </a:rPr>
+              <a:t>deviceType</a:t>
+            </a:r>
+            <a:r>
+              <a:rPr lang="en-US" altLang="zh-CN" sz="500" dirty="0">
+                <a:solidFill>
+                  <a:schemeClr val="tx1">
+                    <a:lumMod val="75000"/>
+                  </a:schemeClr>
+                </a:solidFill>
+                <a:latin typeface="Consolas" panose="020B0609020204030204" pitchFamily="49" charset="0"/>
+              </a:rPr>
+              <a:t>": "GPU",</a:t>
+            </a:r>
+          </a:p>
+          <a:p>
+            <a:r>
+              <a:rPr lang="en-US" altLang="zh-CN" sz="500" dirty="0">
+                <a:solidFill>
+                  <a:schemeClr val="tx1">
+                    <a:lumMod val="75000"/>
+                  </a:schemeClr>
+                </a:solidFill>
+                <a:latin typeface="Consolas" panose="020B0609020204030204" pitchFamily="49" charset="0"/>
+              </a:rPr>
+              <a:t>      "</a:t>
+            </a:r>
+            <a:r>
+              <a:rPr lang="en-US" altLang="zh-CN" sz="500" dirty="0" err="1">
+                <a:solidFill>
+                  <a:schemeClr val="tx1">
+                    <a:lumMod val="75000"/>
+                  </a:schemeClr>
+                </a:solidFill>
+                <a:latin typeface="Consolas" panose="020B0609020204030204" pitchFamily="49" charset="0"/>
+              </a:rPr>
+              <a:t>executionProvider</a:t>
+            </a:r>
+            <a:r>
+              <a:rPr lang="en-US" altLang="zh-CN" sz="500" dirty="0">
+                <a:solidFill>
+                  <a:schemeClr val="tx1">
+                    <a:lumMod val="75000"/>
+                  </a:schemeClr>
+                </a:solidFill>
+                <a:latin typeface="Consolas" panose="020B0609020204030204" pitchFamily="49" charset="0"/>
+              </a:rPr>
+              <a:t>": "</a:t>
+            </a:r>
+            <a:r>
+              <a:rPr lang="en-US" altLang="zh-CN" sz="500" dirty="0" err="1">
+                <a:solidFill>
+                  <a:schemeClr val="tx1">
+                    <a:lumMod val="75000"/>
+                  </a:schemeClr>
+                </a:solidFill>
+                <a:latin typeface="Consolas" panose="020B0609020204030204" pitchFamily="49" charset="0"/>
+              </a:rPr>
+              <a:t>WebGpuExecutionProvider</a:t>
+            </a:r>
+            <a:r>
+              <a:rPr lang="en-US" altLang="zh-CN" sz="500" dirty="0">
+                <a:solidFill>
+                  <a:schemeClr val="tx1">
+                    <a:lumMod val="75000"/>
+                  </a:schemeClr>
+                </a:solidFill>
+                <a:latin typeface="Consolas" panose="020B0609020204030204" pitchFamily="49" charset="0"/>
+              </a:rPr>
+              <a:t>"</a:t>
+            </a:r>
+          </a:p>
+          <a:p>
+            <a:r>
+              <a:rPr lang="en-US" altLang="zh-CN" sz="500" dirty="0">
+                <a:solidFill>
+                  <a:schemeClr val="tx1">
+                    <a:lumMod val="75000"/>
+                  </a:schemeClr>
+                </a:solidFill>
+                <a:latin typeface="Consolas" panose="020B0609020204030204" pitchFamily="49" charset="0"/>
+              </a:rPr>
+              <a:t>    },</a:t>
+            </a:r>
+          </a:p>
+          <a:p>
+            <a:r>
+              <a:rPr lang="en-US" altLang="zh-CN" sz="500" dirty="0">
+                <a:solidFill>
+                  <a:schemeClr val="tx1">
+                    <a:lumMod val="75000"/>
+                  </a:schemeClr>
+                </a:solidFill>
+                <a:latin typeface="Consolas" panose="020B0609020204030204" pitchFamily="49" charset="0"/>
+              </a:rPr>
+              <a:t>    "</a:t>
+            </a:r>
+            <a:r>
+              <a:rPr lang="en-US" altLang="zh-CN" sz="500" dirty="0" err="1">
+                <a:solidFill>
+                  <a:schemeClr val="tx1">
+                    <a:lumMod val="75000"/>
+                  </a:schemeClr>
+                </a:solidFill>
+                <a:latin typeface="Consolas" panose="020B0609020204030204" pitchFamily="49" charset="0"/>
+              </a:rPr>
+              <a:t>fileSizeMb</a:t>
+            </a:r>
+            <a:r>
+              <a:rPr lang="en-US" altLang="zh-CN" sz="500" dirty="0">
+                <a:solidFill>
+                  <a:schemeClr val="tx1">
+                    <a:lumMod val="75000"/>
+                  </a:schemeClr>
+                </a:solidFill>
+                <a:latin typeface="Consolas" panose="020B0609020204030204" pitchFamily="49" charset="0"/>
+              </a:rPr>
+              <a:t>": 8570,</a:t>
+            </a:r>
+          </a:p>
+          <a:p>
+            <a:r>
+              <a:rPr lang="en-US" altLang="zh-CN" sz="500" dirty="0">
+                <a:solidFill>
+                  <a:schemeClr val="tx1">
+                    <a:lumMod val="75000"/>
+                  </a:schemeClr>
+                </a:solidFill>
+                <a:latin typeface="Consolas" panose="020B0609020204030204" pitchFamily="49" charset="0"/>
+              </a:rPr>
+              <a:t>    "</a:t>
+            </a:r>
+            <a:r>
+              <a:rPr lang="en-US" altLang="zh-CN" sz="500" dirty="0" err="1">
+                <a:solidFill>
+                  <a:schemeClr val="tx1">
+                    <a:lumMod val="75000"/>
+                  </a:schemeClr>
+                </a:solidFill>
+                <a:latin typeface="Consolas" panose="020B0609020204030204" pitchFamily="49" charset="0"/>
+              </a:rPr>
+              <a:t>modelSettings</a:t>
+            </a:r>
+            <a:r>
+              <a:rPr lang="en-US" altLang="zh-CN" sz="500" dirty="0">
+                <a:solidFill>
+                  <a:schemeClr val="tx1">
+                    <a:lumMod val="75000"/>
+                  </a:schemeClr>
+                </a:solidFill>
+                <a:latin typeface="Consolas" panose="020B0609020204030204" pitchFamily="49" charset="0"/>
+              </a:rPr>
+              <a:t>": {</a:t>
+            </a:r>
+          </a:p>
+          <a:p>
+            <a:r>
+              <a:rPr lang="en-US" altLang="zh-CN" sz="500" dirty="0">
+                <a:solidFill>
+                  <a:schemeClr val="tx1">
+                    <a:lumMod val="75000"/>
+                  </a:schemeClr>
+                </a:solidFill>
+                <a:latin typeface="Consolas" panose="020B0609020204030204" pitchFamily="49" charset="0"/>
+              </a:rPr>
+              <a:t>      "parameters": []</a:t>
+            </a:r>
+          </a:p>
+          <a:p>
+            <a:r>
+              <a:rPr lang="en-US" altLang="zh-CN" sz="500" dirty="0">
+                <a:solidFill>
+                  <a:schemeClr val="tx1">
+                    <a:lumMod val="75000"/>
+                  </a:schemeClr>
+                </a:solidFill>
+                <a:latin typeface="Consolas" panose="020B0609020204030204" pitchFamily="49" charset="0"/>
+              </a:rPr>
+              <a:t>    },</a:t>
+            </a:r>
+          </a:p>
+          <a:p>
+            <a:r>
+              <a:rPr lang="en-US" altLang="zh-CN" sz="500" dirty="0">
+                <a:solidFill>
+                  <a:schemeClr val="tx1">
+                    <a:lumMod val="75000"/>
+                  </a:schemeClr>
+                </a:solidFill>
+                <a:latin typeface="Consolas" panose="020B0609020204030204" pitchFamily="49" charset="0"/>
+              </a:rPr>
+              <a:t>    "alias": "phi-4",</a:t>
+            </a:r>
+          </a:p>
+          <a:p>
+            <a:r>
+              <a:rPr lang="en-US" altLang="zh-CN" sz="500" dirty="0">
+                <a:solidFill>
+                  <a:schemeClr val="tx1">
+                    <a:lumMod val="75000"/>
+                  </a:schemeClr>
+                </a:solidFill>
+                <a:latin typeface="Consolas" panose="020B0609020204030204" pitchFamily="49" charset="0"/>
+              </a:rPr>
+              <a:t>    "</a:t>
+            </a:r>
+            <a:r>
+              <a:rPr lang="en-US" altLang="zh-CN" sz="500" dirty="0" err="1">
+                <a:solidFill>
+                  <a:schemeClr val="tx1">
+                    <a:lumMod val="75000"/>
+                  </a:schemeClr>
+                </a:solidFill>
+                <a:latin typeface="Consolas" panose="020B0609020204030204" pitchFamily="49" charset="0"/>
+              </a:rPr>
+              <a:t>supportsToolCalling</a:t>
+            </a:r>
+            <a:r>
+              <a:rPr lang="en-US" altLang="zh-CN" sz="500" dirty="0">
+                <a:solidFill>
+                  <a:schemeClr val="tx1">
+                    <a:lumMod val="75000"/>
+                  </a:schemeClr>
+                </a:solidFill>
+                <a:latin typeface="Consolas" panose="020B0609020204030204" pitchFamily="49" charset="0"/>
+              </a:rPr>
+              <a:t>": false,</a:t>
+            </a:r>
+          </a:p>
+          <a:p>
+            <a:r>
+              <a:rPr lang="en-US" altLang="zh-CN" sz="500" dirty="0">
+                <a:solidFill>
+                  <a:schemeClr val="tx1">
+                    <a:lumMod val="75000"/>
+                  </a:schemeClr>
+                </a:solidFill>
+                <a:latin typeface="Consolas" panose="020B0609020204030204" pitchFamily="49" charset="0"/>
+              </a:rPr>
+              <a:t>    "license": "MIT",</a:t>
+            </a:r>
+          </a:p>
+          <a:p>
+            <a:r>
+              <a:rPr lang="en-US" altLang="zh-CN" sz="500" dirty="0">
+                <a:solidFill>
+                  <a:schemeClr val="tx1">
+                    <a:lumMod val="75000"/>
+                  </a:schemeClr>
+                </a:solidFill>
+                <a:latin typeface="Consolas" panose="020B0609020204030204" pitchFamily="49" charset="0"/>
+              </a:rPr>
+              <a:t>    "</a:t>
+            </a:r>
+            <a:r>
+              <a:rPr lang="en-US" altLang="zh-CN" sz="500" dirty="0" err="1">
+                <a:solidFill>
+                  <a:schemeClr val="tx1">
+                    <a:lumMod val="75000"/>
+                  </a:schemeClr>
+                </a:solidFill>
+                <a:latin typeface="Consolas" panose="020B0609020204030204" pitchFamily="49" charset="0"/>
+              </a:rPr>
+              <a:t>licenseDescription</a:t>
+            </a:r>
+            <a:r>
+              <a:rPr lang="en-US" altLang="zh-CN" sz="500" dirty="0">
+                <a:solidFill>
+                  <a:schemeClr val="tx1">
+                    <a:lumMod val="75000"/>
+                  </a:schemeClr>
+                </a:solidFill>
+                <a:latin typeface="Consolas" panose="020B0609020204030204" pitchFamily="49" charset="0"/>
+              </a:rPr>
+              <a:t>": "This model is provided under the License Terms available at &lt;https://huggingface.co/microsoft/phi-4/blob/main/LICENSE&gt;.",</a:t>
+            </a:r>
+          </a:p>
+          <a:p>
+            <a:r>
+              <a:rPr lang="en-US" altLang="zh-CN" sz="500" dirty="0">
+                <a:solidFill>
+                  <a:schemeClr val="tx1">
+                    <a:lumMod val="75000"/>
+                  </a:schemeClr>
+                </a:solidFill>
+                <a:latin typeface="Consolas" panose="020B0609020204030204" pitchFamily="49" charset="0"/>
+              </a:rPr>
+              <a:t>    "</a:t>
+            </a:r>
+            <a:r>
+              <a:rPr lang="en-US" altLang="zh-CN" sz="500" dirty="0" err="1">
+                <a:solidFill>
+                  <a:schemeClr val="tx1">
+                    <a:lumMod val="75000"/>
+                  </a:schemeClr>
+                </a:solidFill>
+                <a:latin typeface="Consolas" panose="020B0609020204030204" pitchFamily="49" charset="0"/>
+              </a:rPr>
+              <a:t>parentModelUri</a:t>
+            </a:r>
+            <a:r>
+              <a:rPr lang="en-US" altLang="zh-CN" sz="500" dirty="0">
+                <a:solidFill>
+                  <a:schemeClr val="tx1">
+                    <a:lumMod val="75000"/>
+                  </a:schemeClr>
+                </a:solidFill>
+                <a:latin typeface="Consolas" panose="020B0609020204030204" pitchFamily="49" charset="0"/>
+              </a:rPr>
+              <a:t>": "</a:t>
+            </a:r>
+            <a:r>
+              <a:rPr lang="en-US" altLang="zh-CN" sz="500" dirty="0" err="1">
+                <a:solidFill>
+                  <a:schemeClr val="tx1">
+                    <a:lumMod val="75000"/>
+                  </a:schemeClr>
+                </a:solidFill>
+                <a:latin typeface="Consolas" panose="020B0609020204030204" pitchFamily="49" charset="0"/>
+              </a:rPr>
+              <a:t>azureml</a:t>
+            </a:r>
+            <a:r>
+              <a:rPr lang="en-US" altLang="zh-CN" sz="500" dirty="0">
+                <a:solidFill>
+                  <a:schemeClr val="tx1">
+                    <a:lumMod val="75000"/>
+                  </a:schemeClr>
+                </a:solidFill>
+                <a:latin typeface="Consolas" panose="020B0609020204030204" pitchFamily="49" charset="0"/>
+              </a:rPr>
+              <a:t>://registries/</a:t>
+            </a:r>
+            <a:r>
+              <a:rPr lang="en-US" altLang="zh-CN" sz="500" dirty="0" err="1">
+                <a:solidFill>
+                  <a:schemeClr val="tx1">
+                    <a:lumMod val="75000"/>
+                  </a:schemeClr>
+                </a:solidFill>
+                <a:latin typeface="Consolas" panose="020B0609020204030204" pitchFamily="49" charset="0"/>
+              </a:rPr>
+              <a:t>azureml</a:t>
+            </a:r>
+            <a:r>
+              <a:rPr lang="en-US" altLang="zh-CN" sz="500" dirty="0">
+                <a:solidFill>
+                  <a:schemeClr val="tx1">
+                    <a:lumMod val="75000"/>
+                  </a:schemeClr>
+                </a:solidFill>
+                <a:latin typeface="Consolas" panose="020B0609020204030204" pitchFamily="49" charset="0"/>
+              </a:rPr>
+              <a:t>/models/Phi-4/versions/7",</a:t>
+            </a:r>
+          </a:p>
+          <a:p>
+            <a:r>
+              <a:rPr lang="en-US" altLang="zh-CN" sz="500" dirty="0">
+                <a:solidFill>
+                  <a:schemeClr val="tx1">
+                    <a:lumMod val="75000"/>
+                  </a:schemeClr>
+                </a:solidFill>
+                <a:latin typeface="Consolas" panose="020B0609020204030204" pitchFamily="49" charset="0"/>
+              </a:rPr>
+              <a:t>    "</a:t>
+            </a:r>
+            <a:r>
+              <a:rPr lang="en-US" altLang="zh-CN" sz="500" dirty="0" err="1">
+                <a:solidFill>
+                  <a:schemeClr val="tx1">
+                    <a:lumMod val="75000"/>
+                  </a:schemeClr>
+                </a:solidFill>
+                <a:latin typeface="Consolas" panose="020B0609020204030204" pitchFamily="49" charset="0"/>
+              </a:rPr>
+              <a:t>maxOutputTokens</a:t>
+            </a:r>
+            <a:r>
+              <a:rPr lang="en-US" altLang="zh-CN" sz="500" dirty="0">
+                <a:solidFill>
+                  <a:schemeClr val="tx1">
+                    <a:lumMod val="75000"/>
+                  </a:schemeClr>
+                </a:solidFill>
+                <a:latin typeface="Consolas" panose="020B0609020204030204" pitchFamily="49" charset="0"/>
+              </a:rPr>
+              <a:t>": 2048,</a:t>
+            </a:r>
+          </a:p>
+          <a:p>
+            <a:r>
+              <a:rPr lang="en-US" altLang="zh-CN" sz="500" dirty="0">
+                <a:solidFill>
+                  <a:schemeClr val="tx1">
+                    <a:lumMod val="75000"/>
+                  </a:schemeClr>
+                </a:solidFill>
+                <a:latin typeface="Consolas" panose="020B0609020204030204" pitchFamily="49" charset="0"/>
+              </a:rPr>
+              <a:t>    "</a:t>
+            </a:r>
+            <a:r>
+              <a:rPr lang="en-US" altLang="zh-CN" sz="500" dirty="0" err="1">
+                <a:solidFill>
+                  <a:schemeClr val="tx1">
+                    <a:lumMod val="75000"/>
+                  </a:schemeClr>
+                </a:solidFill>
+                <a:latin typeface="Consolas" panose="020B0609020204030204" pitchFamily="49" charset="0"/>
+              </a:rPr>
+              <a:t>minFLVersion</a:t>
+            </a:r>
+            <a:r>
+              <a:rPr lang="en-US" altLang="zh-CN" sz="500" dirty="0">
+                <a:solidFill>
+                  <a:schemeClr val="tx1">
+                    <a:lumMod val="75000"/>
+                  </a:schemeClr>
+                </a:solidFill>
+                <a:latin typeface="Consolas" panose="020B0609020204030204" pitchFamily="49" charset="0"/>
+              </a:rPr>
+              <a:t>": null</a:t>
+            </a:r>
+          </a:p>
+          <a:p>
+            <a:r>
+              <a:rPr lang="en-US" altLang="zh-CN" sz="500" dirty="0">
+                <a:solidFill>
+                  <a:schemeClr val="tx1">
+                    <a:lumMod val="75000"/>
+                  </a:schemeClr>
+                </a:solidFill>
+                <a:latin typeface="Consolas" panose="020B0609020204030204" pitchFamily="49" charset="0"/>
+              </a:rPr>
+              <a:t>    },</a:t>
+            </a:r>
+          </a:p>
+          <a:p>
+            <a:r>
+              <a:rPr lang="en-US" altLang="zh-CN" sz="500" dirty="0">
+                <a:solidFill>
+                  <a:schemeClr val="tx1">
+                    <a:lumMod val="75000"/>
+                  </a:schemeClr>
+                </a:solidFill>
+                <a:latin typeface="Consolas" panose="020B0609020204030204" pitchFamily="49" charset="0"/>
+              </a:rPr>
+              <a:t>    // … Other model info objects are omitted here.</a:t>
+            </a:r>
+          </a:p>
+          <a:p>
+            <a:r>
+              <a:rPr lang="en-US" altLang="zh-CN" sz="500" dirty="0">
+                <a:solidFill>
+                  <a:schemeClr val="tx1">
+                    <a:lumMod val="75000"/>
+                  </a:schemeClr>
+                </a:solidFill>
+                <a:latin typeface="Consolas" panose="020B0609020204030204" pitchFamily="49" charset="0"/>
+              </a:rPr>
+              <a:t>]</a:t>
+            </a:r>
+          </a:p>
+        </p:txBody>
+      </p:sp>
+      <p:sp>
+        <p:nvSpPr>
+          <p:cNvPr id="56" name="矩形 55">
+            <a:extLst>
+              <a:ext uri="{FF2B5EF4-FFF2-40B4-BE49-F238E27FC236}">
+                <a16:creationId xmlns:a16="http://schemas.microsoft.com/office/drawing/2014/main" id="{17824547-C8C1-987C-5952-DBFA0B95FAE2}"/>
+              </a:ext>
+            </a:extLst>
+          </p:cNvPr>
+          <p:cNvSpPr/>
+          <p:nvPr/>
+        </p:nvSpPr>
+        <p:spPr>
+          <a:xfrm>
+            <a:off x="4764618" y="6364926"/>
+            <a:ext cx="1080000" cy="216000"/>
+          </a:xfrm>
+          <a:prstGeom prst="rect">
+            <a:avLst/>
+          </a:prstGeom>
+          <a:solidFill>
+            <a:schemeClr val="accent2"/>
+          </a:solidFill>
+          <a:ln>
+            <a:noFill/>
+          </a:ln>
+        </p:spPr>
+        <p:style>
+          <a:lnRef idx="2">
+            <a:schemeClr val="accent1">
+              <a:shade val="15000"/>
+            </a:schemeClr>
+          </a:lnRef>
+          <a:fillRef idx="1">
+            <a:schemeClr val="accent1"/>
+          </a:fillRef>
+          <a:effectRef idx="0">
+            <a:schemeClr val="accent1"/>
+          </a:effectRef>
+          <a:fontRef idx="minor">
+            <a:schemeClr val="lt1"/>
+          </a:fontRef>
+        </p:style>
+        <p:txBody>
+          <a:bodyPr rtlCol="0" anchor="ctr"/>
+          <a:lstStyle/>
+          <a:p>
+            <a:pPr algn="ctr"/>
+            <a:r>
+              <a:rPr lang="en-US" altLang="zh-CN" sz="1200" dirty="0"/>
+              <a:t>Sample</a:t>
+            </a:r>
+            <a:endParaRPr lang="zh-CN" altLang="en-US" sz="1200" dirty="0"/>
+          </a:p>
+        </p:txBody>
+      </p:sp>
+      <p:pic>
+        <p:nvPicPr>
+          <p:cNvPr id="58" name="图形 57" descr="文档 纯色填充">
+            <a:extLst>
+              <a:ext uri="{FF2B5EF4-FFF2-40B4-BE49-F238E27FC236}">
+                <a16:creationId xmlns:a16="http://schemas.microsoft.com/office/drawing/2014/main" id="{701E205C-13E4-EDE7-AD78-DCEE739ED8BF}"/>
+              </a:ext>
+            </a:extLst>
+          </p:cNvPr>
+          <p:cNvPicPr>
+            <a:picLocks noChangeAspect="1"/>
+          </p:cNvPicPr>
+          <p:nvPr/>
+        </p:nvPicPr>
+        <p:blipFill>
+          <a:blip r:embed="rId6">
+            <a:extLst>
+              <a:ext uri="{96DAC541-7B7A-43D3-8B79-37D633B846F1}">
+                <asvg:svgBlip xmlns:asvg="http://schemas.microsoft.com/office/drawing/2016/SVG/main" r:embed="rId7"/>
+              </a:ext>
+            </a:extLst>
+          </a:blip>
+          <a:stretch>
+            <a:fillRect/>
+          </a:stretch>
+        </p:blipFill>
+        <p:spPr>
+          <a:xfrm>
+            <a:off x="6327768" y="4425735"/>
+            <a:ext cx="288000" cy="288000"/>
+          </a:xfrm>
+          <a:prstGeom prst="rect">
+            <a:avLst/>
+          </a:prstGeom>
+        </p:spPr>
+      </p:pic>
+      <p:sp>
+        <p:nvSpPr>
+          <p:cNvPr id="63" name="文本框 62">
+            <a:extLst>
+              <a:ext uri="{FF2B5EF4-FFF2-40B4-BE49-F238E27FC236}">
+                <a16:creationId xmlns:a16="http://schemas.microsoft.com/office/drawing/2014/main" id="{3A9983E0-5467-08BF-6B37-CB225A4E18E0}"/>
+              </a:ext>
+            </a:extLst>
+          </p:cNvPr>
+          <p:cNvSpPr txBox="1"/>
+          <p:nvPr/>
+        </p:nvSpPr>
+        <p:spPr>
+          <a:xfrm>
+            <a:off x="8516500" y="1713401"/>
+            <a:ext cx="2980175" cy="276999"/>
+          </a:xfrm>
+          <a:prstGeom prst="rect">
+            <a:avLst/>
+          </a:prstGeom>
+          <a:noFill/>
+        </p:spPr>
+        <p:txBody>
+          <a:bodyPr wrap="none" rtlCol="0">
+            <a:spAutoFit/>
+          </a:bodyPr>
+          <a:lstStyle/>
+          <a:p>
+            <a:r>
+              <a:rPr lang="en-US" altLang="zh-CN" sz="1200" dirty="0">
+                <a:solidFill>
+                  <a:schemeClr val="tx1">
+                    <a:lumMod val="75000"/>
+                  </a:schemeClr>
+                </a:solidFill>
+              </a:rPr>
+              <a:t>%USERPROFILE%\.foundry\cache\models</a:t>
+            </a:r>
+            <a:endParaRPr lang="zh-CN" altLang="en-US" sz="1200" dirty="0">
+              <a:solidFill>
+                <a:schemeClr val="tx1">
+                  <a:lumMod val="75000"/>
+                </a:schemeClr>
+              </a:solidFill>
+            </a:endParaRPr>
+          </a:p>
+        </p:txBody>
+      </p:sp>
+      <p:sp>
+        <p:nvSpPr>
+          <p:cNvPr id="79" name="文本框 78">
+            <a:extLst>
+              <a:ext uri="{FF2B5EF4-FFF2-40B4-BE49-F238E27FC236}">
+                <a16:creationId xmlns:a16="http://schemas.microsoft.com/office/drawing/2014/main" id="{44262E9A-B000-6054-EFC3-0C09353E89AA}"/>
+              </a:ext>
+            </a:extLst>
+          </p:cNvPr>
+          <p:cNvSpPr txBox="1"/>
+          <p:nvPr/>
+        </p:nvSpPr>
+        <p:spPr>
+          <a:xfrm>
+            <a:off x="6606754" y="2937863"/>
+            <a:ext cx="756000" cy="288000"/>
+          </a:xfrm>
+          <a:prstGeom prst="rect">
+            <a:avLst/>
+          </a:prstGeom>
+          <a:noFill/>
+        </p:spPr>
+        <p:txBody>
+          <a:bodyPr wrap="none" rtlCol="0">
+            <a:noAutofit/>
+          </a:bodyPr>
+          <a:lstStyle/>
+          <a:p>
+            <a:r>
+              <a:rPr lang="en-US" altLang="zh-CN" sz="1200" dirty="0"/>
+              <a:t>Model A</a:t>
+            </a:r>
+            <a:endParaRPr lang="zh-CN" altLang="en-US" sz="1200" dirty="0"/>
+          </a:p>
+        </p:txBody>
+      </p:sp>
+      <p:sp>
+        <p:nvSpPr>
+          <p:cNvPr id="80" name="文本框 79">
+            <a:extLst>
+              <a:ext uri="{FF2B5EF4-FFF2-40B4-BE49-F238E27FC236}">
+                <a16:creationId xmlns:a16="http://schemas.microsoft.com/office/drawing/2014/main" id="{88B0D4F5-6B9F-0F45-8CF1-D403A3F32DF2}"/>
+              </a:ext>
+            </a:extLst>
+          </p:cNvPr>
+          <p:cNvSpPr txBox="1"/>
+          <p:nvPr/>
+        </p:nvSpPr>
+        <p:spPr>
+          <a:xfrm>
+            <a:off x="6606806" y="3294442"/>
+            <a:ext cx="756000" cy="288000"/>
+          </a:xfrm>
+          <a:prstGeom prst="rect">
+            <a:avLst/>
+          </a:prstGeom>
+          <a:noFill/>
+        </p:spPr>
+        <p:txBody>
+          <a:bodyPr wrap="none" rtlCol="0">
+            <a:noAutofit/>
+          </a:bodyPr>
+          <a:lstStyle/>
+          <a:p>
+            <a:r>
+              <a:rPr lang="en-US" altLang="zh-CN" sz="1200" dirty="0"/>
+              <a:t>Model B</a:t>
+            </a:r>
+            <a:endParaRPr lang="zh-CN" altLang="en-US" sz="1200" dirty="0"/>
+          </a:p>
+        </p:txBody>
+      </p:sp>
+      <p:sp>
+        <p:nvSpPr>
+          <p:cNvPr id="81" name="文本框 80">
+            <a:extLst>
+              <a:ext uri="{FF2B5EF4-FFF2-40B4-BE49-F238E27FC236}">
+                <a16:creationId xmlns:a16="http://schemas.microsoft.com/office/drawing/2014/main" id="{0DF3B428-59EC-742C-2E76-2F08427377E6}"/>
+              </a:ext>
+            </a:extLst>
+          </p:cNvPr>
+          <p:cNvSpPr txBox="1"/>
+          <p:nvPr/>
+        </p:nvSpPr>
+        <p:spPr>
+          <a:xfrm>
+            <a:off x="6606806" y="3663514"/>
+            <a:ext cx="756000" cy="288000"/>
+          </a:xfrm>
+          <a:prstGeom prst="rect">
+            <a:avLst/>
+          </a:prstGeom>
+          <a:noFill/>
+        </p:spPr>
+        <p:txBody>
+          <a:bodyPr wrap="none" rtlCol="0">
+            <a:noAutofit/>
+          </a:bodyPr>
+          <a:lstStyle/>
+          <a:p>
+            <a:r>
+              <a:rPr lang="en-US" altLang="zh-CN" sz="1200" dirty="0"/>
+              <a:t>Model C</a:t>
+            </a:r>
+            <a:endParaRPr lang="zh-CN" altLang="en-US" sz="1200" dirty="0"/>
+          </a:p>
+        </p:txBody>
+      </p:sp>
+      <p:sp>
+        <p:nvSpPr>
+          <p:cNvPr id="84" name="文本框 83">
+            <a:extLst>
+              <a:ext uri="{FF2B5EF4-FFF2-40B4-BE49-F238E27FC236}">
+                <a16:creationId xmlns:a16="http://schemas.microsoft.com/office/drawing/2014/main" id="{716DC69E-365F-16DF-733C-E13E68022B75}"/>
+              </a:ext>
+            </a:extLst>
+          </p:cNvPr>
+          <p:cNvSpPr txBox="1"/>
+          <p:nvPr/>
+        </p:nvSpPr>
+        <p:spPr>
+          <a:xfrm>
+            <a:off x="695322" y="2134400"/>
+            <a:ext cx="5328000" cy="2785378"/>
+          </a:xfrm>
+          <a:prstGeom prst="rect">
+            <a:avLst/>
+          </a:prstGeom>
+          <a:noFill/>
+        </p:spPr>
+        <p:txBody>
+          <a:bodyPr wrap="square">
+            <a:spAutoFit/>
+          </a:bodyPr>
+          <a:lstStyle/>
+          <a:p>
+            <a:pPr>
+              <a:lnSpc>
+                <a:spcPts val="1425"/>
+              </a:lnSpc>
+            </a:pPr>
+            <a:r>
+              <a:rPr lang="en-US" altLang="zh-CN" sz="1200" b="0" dirty="0">
+                <a:solidFill>
+                  <a:schemeClr val="tx1">
+                    <a:lumMod val="95000"/>
+                  </a:schemeClr>
+                </a:solidFill>
+                <a:effectLst/>
+              </a:rPr>
+              <a:t>In array. Each item contains following fields.</a:t>
+            </a:r>
+          </a:p>
+          <a:p>
+            <a:pPr marL="171450" indent="-171450">
+              <a:lnSpc>
+                <a:spcPts val="1425"/>
+              </a:lnSpc>
+              <a:buFont typeface="Arial" panose="020B0604020202020204" pitchFamily="34" charset="0"/>
+              <a:buChar char="•"/>
+            </a:pPr>
+            <a:r>
+              <a:rPr lang="en-US" altLang="zh-CN" sz="1200" b="0" dirty="0">
+                <a:solidFill>
+                  <a:srgbClr val="CE9178"/>
+                </a:solidFill>
+                <a:effectLst/>
+                <a:latin typeface="Consolas" panose="020B0609020204030204" pitchFamily="49" charset="0"/>
+              </a:rPr>
+              <a:t>name</a:t>
+            </a:r>
+            <a:r>
+              <a:rPr lang="en-US" altLang="zh-CN" sz="1200" dirty="0">
+                <a:solidFill>
+                  <a:srgbClr val="CCCCCC"/>
+                </a:solidFill>
+                <a:latin typeface="Consolas" panose="020B0609020204030204" pitchFamily="49" charset="0"/>
+              </a:rPr>
+              <a:t> </a:t>
+            </a:r>
+            <a:r>
+              <a:rPr lang="en-US" altLang="zh-CN" sz="1200" b="0" i="1" dirty="0">
+                <a:solidFill>
+                  <a:schemeClr val="tx1">
+                    <a:lumMod val="50000"/>
+                  </a:schemeClr>
+                </a:solidFill>
+                <a:effectLst/>
+                <a:latin typeface="Consolas" panose="020B0609020204030204" pitchFamily="49" charset="0"/>
+              </a:rPr>
+              <a:t>string</a:t>
+            </a:r>
+            <a:r>
+              <a:rPr lang="en-US" altLang="zh-CN" sz="1200" b="0" dirty="0">
+                <a:solidFill>
+                  <a:srgbClr val="CCCCCC"/>
+                </a:solidFill>
+                <a:effectLst/>
+              </a:rPr>
+              <a:t>: Model ID (the unique identifier of the model).</a:t>
+            </a:r>
+          </a:p>
+          <a:p>
+            <a:pPr marL="171450" indent="-171450">
+              <a:lnSpc>
+                <a:spcPts val="1425"/>
+              </a:lnSpc>
+              <a:buFont typeface="Arial" panose="020B0604020202020204" pitchFamily="34" charset="0"/>
+              <a:buChar char="•"/>
+            </a:pPr>
+            <a:r>
+              <a:rPr lang="en-US" altLang="zh-CN" sz="1200" b="0" dirty="0" err="1">
+                <a:solidFill>
+                  <a:srgbClr val="CE9178"/>
+                </a:solidFill>
+                <a:effectLst/>
+                <a:latin typeface="Consolas" panose="020B0609020204030204" pitchFamily="49" charset="0"/>
+              </a:rPr>
+              <a:t>displayName</a:t>
+            </a:r>
+            <a:r>
+              <a:rPr lang="en-US" altLang="zh-CN" sz="1200" b="0" dirty="0">
+                <a:solidFill>
+                  <a:srgbClr val="CCCCCC"/>
+                </a:solidFill>
+                <a:effectLst/>
+                <a:latin typeface="Consolas" panose="020B0609020204030204" pitchFamily="49" charset="0"/>
+              </a:rPr>
+              <a:t> </a:t>
+            </a:r>
+            <a:r>
+              <a:rPr lang="en-US" altLang="zh-CN" sz="1200" b="0" i="1" dirty="0">
+                <a:solidFill>
+                  <a:schemeClr val="tx1">
+                    <a:lumMod val="50000"/>
+                  </a:schemeClr>
+                </a:solidFill>
+                <a:effectLst/>
+                <a:latin typeface="Consolas" panose="020B0609020204030204" pitchFamily="49" charset="0"/>
+              </a:rPr>
+              <a:t>string</a:t>
+            </a:r>
+            <a:r>
+              <a:rPr lang="en-US" altLang="zh-CN" sz="1200" b="0" dirty="0">
+                <a:solidFill>
+                  <a:srgbClr val="CCCCCC"/>
+                </a:solidFill>
+                <a:effectLst/>
+              </a:rPr>
+              <a:t>: display name.</a:t>
+            </a:r>
+          </a:p>
+          <a:p>
+            <a:pPr marL="171450" indent="-171450">
+              <a:lnSpc>
+                <a:spcPts val="1425"/>
+              </a:lnSpc>
+              <a:buFont typeface="Arial" panose="020B0604020202020204" pitchFamily="34" charset="0"/>
+              <a:buChar char="•"/>
+            </a:pPr>
+            <a:r>
+              <a:rPr lang="en-US" altLang="zh-CN" sz="1200" b="0" dirty="0">
+                <a:solidFill>
+                  <a:srgbClr val="CE9178"/>
+                </a:solidFill>
+                <a:effectLst/>
+                <a:latin typeface="Consolas" panose="020B0609020204030204" pitchFamily="49" charset="0"/>
+              </a:rPr>
+              <a:t>alias</a:t>
+            </a:r>
+            <a:r>
+              <a:rPr lang="en-US" altLang="zh-CN" sz="1200" b="0" dirty="0">
+                <a:solidFill>
+                  <a:srgbClr val="CCCCCC"/>
+                </a:solidFill>
+                <a:effectLst/>
+                <a:latin typeface="Consolas" panose="020B0609020204030204" pitchFamily="49" charset="0"/>
+              </a:rPr>
+              <a:t> </a:t>
+            </a:r>
+            <a:r>
+              <a:rPr lang="en-US" altLang="zh-CN" sz="1200" b="0" i="1" dirty="0">
+                <a:solidFill>
+                  <a:schemeClr val="tx1">
+                    <a:lumMod val="50000"/>
+                  </a:schemeClr>
+                </a:solidFill>
+                <a:effectLst/>
+                <a:latin typeface="Consolas" panose="020B0609020204030204" pitchFamily="49" charset="0"/>
+              </a:rPr>
+              <a:t>string</a:t>
+            </a:r>
+            <a:r>
+              <a:rPr lang="en-US" altLang="zh-CN" sz="1200" b="0" dirty="0">
+                <a:solidFill>
+                  <a:srgbClr val="CCCCCC"/>
+                </a:solidFill>
+                <a:effectLst/>
+              </a:rPr>
+              <a:t>: model abbreviation.</a:t>
+            </a:r>
+          </a:p>
+          <a:p>
+            <a:pPr marL="171450" indent="-171450">
+              <a:lnSpc>
+                <a:spcPts val="1425"/>
+              </a:lnSpc>
+              <a:buFont typeface="Arial" panose="020B0604020202020204" pitchFamily="34" charset="0"/>
+              <a:buChar char="•"/>
+            </a:pPr>
+            <a:r>
+              <a:rPr lang="en-US" altLang="zh-CN" sz="1200" b="0" dirty="0">
+                <a:solidFill>
+                  <a:srgbClr val="CE9178"/>
+                </a:solidFill>
+                <a:effectLst/>
+                <a:latin typeface="Consolas" panose="020B0609020204030204" pitchFamily="49" charset="0"/>
+              </a:rPr>
+              <a:t>version</a:t>
+            </a:r>
+            <a:r>
+              <a:rPr lang="en-US" altLang="zh-CN" sz="1200" b="0" dirty="0">
+                <a:solidFill>
+                  <a:srgbClr val="CCCCCC"/>
+                </a:solidFill>
+                <a:effectLst/>
+                <a:latin typeface="Consolas" panose="020B0609020204030204" pitchFamily="49" charset="0"/>
+              </a:rPr>
+              <a:t> </a:t>
+            </a:r>
+            <a:r>
+              <a:rPr lang="en-US" altLang="zh-CN" sz="1200" b="0" i="1" dirty="0">
+                <a:solidFill>
+                  <a:schemeClr val="tx1">
+                    <a:lumMod val="50000"/>
+                  </a:schemeClr>
+                </a:solidFill>
+                <a:effectLst/>
+                <a:latin typeface="Consolas" panose="020B0609020204030204" pitchFamily="49" charset="0"/>
+              </a:rPr>
+              <a:t>string</a:t>
+            </a:r>
+            <a:r>
+              <a:rPr lang="en-US" altLang="zh-CN" sz="1200" b="0" dirty="0">
+                <a:solidFill>
+                  <a:srgbClr val="CCCCCC"/>
+                </a:solidFill>
+                <a:effectLst/>
+              </a:rPr>
+              <a:t>: The version number of the model.</a:t>
+            </a:r>
+          </a:p>
+          <a:p>
+            <a:pPr marL="171450" indent="-171450">
+              <a:lnSpc>
+                <a:spcPts val="1425"/>
+              </a:lnSpc>
+              <a:buFont typeface="Arial" panose="020B0604020202020204" pitchFamily="34" charset="0"/>
+              <a:buChar char="•"/>
+            </a:pPr>
+            <a:r>
+              <a:rPr lang="en-US" altLang="zh-CN" sz="1200" b="0" dirty="0" err="1">
+                <a:solidFill>
+                  <a:srgbClr val="CE9178"/>
+                </a:solidFill>
+                <a:effectLst/>
+                <a:latin typeface="Consolas" panose="020B0609020204030204" pitchFamily="49" charset="0"/>
+              </a:rPr>
+              <a:t>uri</a:t>
+            </a:r>
+            <a:r>
+              <a:rPr lang="en-US" altLang="zh-CN" sz="1200" b="0" dirty="0">
+                <a:solidFill>
+                  <a:srgbClr val="CCCCCC"/>
+                </a:solidFill>
+                <a:effectLst/>
+                <a:latin typeface="Consolas" panose="020B0609020204030204" pitchFamily="49" charset="0"/>
+              </a:rPr>
+              <a:t> </a:t>
+            </a:r>
+            <a:r>
+              <a:rPr lang="en-US" altLang="zh-CN" sz="1200" b="0" i="1" dirty="0">
+                <a:solidFill>
+                  <a:schemeClr val="tx1">
+                    <a:lumMod val="50000"/>
+                  </a:schemeClr>
+                </a:solidFill>
+                <a:effectLst/>
+                <a:latin typeface="Consolas" panose="020B0609020204030204" pitchFamily="49" charset="0"/>
+              </a:rPr>
+              <a:t>string</a:t>
+            </a:r>
+            <a:r>
+              <a:rPr lang="en-US" altLang="zh-CN" sz="1200" b="0" dirty="0">
+                <a:solidFill>
+                  <a:srgbClr val="CCCCCC"/>
+                </a:solidFill>
+                <a:effectLst/>
+              </a:rPr>
+              <a:t>: Model resource address in the Azure AI Foundry Catalog.</a:t>
+            </a:r>
+          </a:p>
+          <a:p>
+            <a:pPr marL="171450" indent="-171450">
+              <a:lnSpc>
+                <a:spcPts val="1425"/>
+              </a:lnSpc>
+              <a:buFont typeface="Arial" panose="020B0604020202020204" pitchFamily="34" charset="0"/>
+              <a:buChar char="•"/>
+            </a:pPr>
+            <a:r>
+              <a:rPr lang="en-US" altLang="zh-CN" sz="1200" b="0" dirty="0">
+                <a:solidFill>
+                  <a:srgbClr val="CE9178"/>
+                </a:solidFill>
+                <a:effectLst/>
+                <a:latin typeface="Consolas" panose="020B0609020204030204" pitchFamily="49" charset="0"/>
+              </a:rPr>
+              <a:t>publisher</a:t>
+            </a:r>
+            <a:r>
+              <a:rPr lang="en-US" altLang="zh-CN" sz="1200" b="0" dirty="0">
+                <a:solidFill>
+                  <a:srgbClr val="CCCCCC"/>
+                </a:solidFill>
+                <a:effectLst/>
+                <a:latin typeface="Consolas" panose="020B0609020204030204" pitchFamily="49" charset="0"/>
+              </a:rPr>
+              <a:t> </a:t>
+            </a:r>
+            <a:r>
+              <a:rPr lang="en-US" altLang="zh-CN" sz="1200" b="0" i="1" dirty="0">
+                <a:solidFill>
+                  <a:schemeClr val="tx1">
+                    <a:lumMod val="50000"/>
+                  </a:schemeClr>
+                </a:solidFill>
+                <a:effectLst/>
+                <a:latin typeface="Consolas" panose="020B0609020204030204" pitchFamily="49" charset="0"/>
+              </a:rPr>
+              <a:t>string</a:t>
+            </a:r>
+            <a:r>
+              <a:rPr lang="en-US" altLang="zh-CN" sz="1200" b="0" dirty="0">
+                <a:solidFill>
+                  <a:srgbClr val="CCCCCC"/>
+                </a:solidFill>
+                <a:effectLst/>
+              </a:rPr>
+              <a:t>: </a:t>
+            </a:r>
+            <a:r>
+              <a:rPr lang="en-US" altLang="zh-CN" sz="1200" dirty="0">
+                <a:solidFill>
+                  <a:srgbClr val="CCCCCC"/>
+                </a:solidFill>
+              </a:rPr>
+              <a:t>T</a:t>
+            </a:r>
+            <a:r>
+              <a:rPr lang="en-US" altLang="zh-CN" sz="1200" b="0" dirty="0">
+                <a:solidFill>
+                  <a:srgbClr val="CCCCCC"/>
+                </a:solidFill>
+                <a:effectLst/>
+              </a:rPr>
+              <a:t>he name of publisher.</a:t>
+            </a:r>
+          </a:p>
+          <a:p>
+            <a:pPr marL="171450" indent="-171450">
+              <a:lnSpc>
+                <a:spcPts val="1425"/>
+              </a:lnSpc>
+              <a:buFont typeface="Arial" panose="020B0604020202020204" pitchFamily="34" charset="0"/>
+              <a:buChar char="•"/>
+            </a:pPr>
+            <a:r>
+              <a:rPr lang="en-US" altLang="zh-CN" sz="1200" b="0" dirty="0">
+                <a:solidFill>
+                  <a:srgbClr val="CE9178"/>
+                </a:solidFill>
+                <a:effectLst/>
+                <a:latin typeface="Consolas" panose="020B0609020204030204" pitchFamily="49" charset="0"/>
+              </a:rPr>
+              <a:t>task</a:t>
+            </a:r>
+            <a:r>
+              <a:rPr lang="en-US" altLang="zh-CN" sz="1200" b="0" dirty="0">
+                <a:solidFill>
+                  <a:srgbClr val="CCCCCC"/>
+                </a:solidFill>
+                <a:effectLst/>
+                <a:latin typeface="Consolas" panose="020B0609020204030204" pitchFamily="49" charset="0"/>
+              </a:rPr>
+              <a:t> </a:t>
+            </a:r>
+            <a:r>
+              <a:rPr lang="en-US" altLang="zh-CN" sz="1200" b="0" i="1" dirty="0">
+                <a:solidFill>
+                  <a:schemeClr val="tx1">
+                    <a:lumMod val="50000"/>
+                  </a:schemeClr>
+                </a:solidFill>
+                <a:effectLst/>
+                <a:latin typeface="Consolas" panose="020B0609020204030204" pitchFamily="49" charset="0"/>
+              </a:rPr>
+              <a:t>string</a:t>
+            </a:r>
+            <a:r>
+              <a:rPr lang="en-US" altLang="zh-CN" sz="1200" b="0" dirty="0">
+                <a:solidFill>
+                  <a:srgbClr val="CCCCCC"/>
+                </a:solidFill>
+                <a:effectLst/>
+              </a:rPr>
+              <a:t>: The type of model feature</a:t>
+            </a:r>
+            <a:r>
+              <a:rPr lang="en-US" altLang="zh-CN" sz="1200" dirty="0">
+                <a:solidFill>
+                  <a:srgbClr val="CCCCCC"/>
+                </a:solidFill>
+              </a:rPr>
+              <a:t>.</a:t>
+            </a:r>
+            <a:endParaRPr lang="en-US" altLang="zh-CN" sz="1200" b="0" dirty="0">
+              <a:solidFill>
+                <a:srgbClr val="CCCCCC"/>
+              </a:solidFill>
+              <a:effectLst/>
+            </a:endParaRPr>
+          </a:p>
+          <a:p>
+            <a:pPr marL="171450" indent="-171450">
+              <a:lnSpc>
+                <a:spcPts val="1425"/>
+              </a:lnSpc>
+              <a:buFont typeface="Arial" panose="020B0604020202020204" pitchFamily="34" charset="0"/>
+              <a:buChar char="•"/>
+            </a:pPr>
+            <a:r>
+              <a:rPr lang="en-US" altLang="zh-CN" sz="1200" b="0" dirty="0" err="1">
+                <a:solidFill>
+                  <a:srgbClr val="CE9178"/>
+                </a:solidFill>
+                <a:effectLst/>
+                <a:latin typeface="Consolas" panose="020B0609020204030204" pitchFamily="49" charset="0"/>
+              </a:rPr>
+              <a:t>supportsToolCalling</a:t>
+            </a:r>
+            <a:r>
+              <a:rPr lang="en-US" altLang="zh-CN" sz="1200" b="0" dirty="0">
+                <a:solidFill>
+                  <a:srgbClr val="CCCCCC"/>
+                </a:solidFill>
+                <a:effectLst/>
+                <a:latin typeface="Consolas" panose="020B0609020204030204" pitchFamily="49" charset="0"/>
+              </a:rPr>
+              <a:t> </a:t>
+            </a:r>
+            <a:r>
+              <a:rPr lang="en-US" altLang="zh-CN" sz="1200" b="0" i="1" dirty="0" err="1">
+                <a:solidFill>
+                  <a:schemeClr val="tx1">
+                    <a:lumMod val="50000"/>
+                  </a:schemeClr>
+                </a:solidFill>
+                <a:effectLst/>
+                <a:latin typeface="Consolas" panose="020B0609020204030204" pitchFamily="49" charset="0"/>
+              </a:rPr>
+              <a:t>boolean</a:t>
+            </a:r>
+            <a:r>
+              <a:rPr lang="en-US" altLang="zh-CN" sz="1200" b="0" dirty="0">
+                <a:solidFill>
+                  <a:srgbClr val="CCCCCC"/>
+                </a:solidFill>
+                <a:effectLst/>
+              </a:rPr>
+              <a:t>: Whether the tool call is supported.</a:t>
+            </a:r>
+          </a:p>
+          <a:p>
+            <a:pPr marL="171450" indent="-171450">
+              <a:lnSpc>
+                <a:spcPts val="1425"/>
+              </a:lnSpc>
+              <a:buFont typeface="Arial" panose="020B0604020202020204" pitchFamily="34" charset="0"/>
+              <a:buChar char="•"/>
+            </a:pPr>
+            <a:r>
+              <a:rPr lang="en-US" altLang="zh-CN" sz="1200" b="0" dirty="0">
+                <a:solidFill>
+                  <a:srgbClr val="CE9178"/>
+                </a:solidFill>
+                <a:effectLst/>
+                <a:latin typeface="Consolas" panose="020B0609020204030204" pitchFamily="49" charset="0"/>
+              </a:rPr>
+              <a:t>runtime</a:t>
+            </a:r>
+            <a:r>
+              <a:rPr lang="en-US" altLang="zh-CN" sz="1200" b="0" dirty="0">
+                <a:solidFill>
+                  <a:srgbClr val="CCCCCC"/>
+                </a:solidFill>
+                <a:effectLst/>
+                <a:latin typeface="Consolas" panose="020B0609020204030204" pitchFamily="49" charset="0"/>
+              </a:rPr>
+              <a:t> </a:t>
+            </a:r>
+            <a:r>
+              <a:rPr lang="en-US" altLang="zh-CN" sz="1200" b="0" i="1" dirty="0">
+                <a:solidFill>
+                  <a:schemeClr val="tx1">
+                    <a:lumMod val="50000"/>
+                  </a:schemeClr>
+                </a:solidFill>
+                <a:effectLst/>
+                <a:latin typeface="Consolas" panose="020B0609020204030204" pitchFamily="49" charset="0"/>
+              </a:rPr>
+              <a:t>object</a:t>
+            </a:r>
+            <a:r>
+              <a:rPr lang="en-US" altLang="zh-CN" sz="1200" b="0" dirty="0">
+                <a:solidFill>
+                  <a:srgbClr val="CCCCCC"/>
+                </a:solidFill>
+                <a:effectLst/>
+              </a:rPr>
+              <a:t>: Includes the following fields.</a:t>
+            </a:r>
+          </a:p>
+          <a:p>
+            <a:pPr marL="360000" lvl="1" indent="-171450">
+              <a:lnSpc>
+                <a:spcPts val="1425"/>
+              </a:lnSpc>
+              <a:buFont typeface="Arial" panose="020B0604020202020204" pitchFamily="34" charset="0"/>
+              <a:buChar char="•"/>
+            </a:pPr>
+            <a:r>
+              <a:rPr lang="en-US" altLang="zh-CN" sz="1200" b="0" dirty="0" err="1">
+                <a:solidFill>
+                  <a:srgbClr val="CE9178"/>
+                </a:solidFill>
+                <a:effectLst/>
+                <a:latin typeface="Consolas" panose="020B0609020204030204" pitchFamily="49" charset="0"/>
+              </a:rPr>
+              <a:t>deviceType</a:t>
+            </a:r>
+            <a:r>
+              <a:rPr lang="en-US" altLang="zh-CN" sz="1200" b="0" dirty="0">
+                <a:solidFill>
+                  <a:srgbClr val="CCCCCC"/>
+                </a:solidFill>
+                <a:effectLst/>
+                <a:latin typeface="Consolas" panose="020B0609020204030204" pitchFamily="49" charset="0"/>
+              </a:rPr>
+              <a:t> </a:t>
+            </a:r>
+            <a:r>
+              <a:rPr lang="en-US" altLang="zh-CN" sz="1200" b="0" i="1" dirty="0">
+                <a:solidFill>
+                  <a:schemeClr val="tx1">
+                    <a:lumMod val="50000"/>
+                  </a:schemeClr>
+                </a:solidFill>
+                <a:effectLst/>
+                <a:latin typeface="Consolas" panose="020B0609020204030204" pitchFamily="49" charset="0"/>
+              </a:rPr>
+              <a:t>string</a:t>
+            </a:r>
+            <a:r>
+              <a:rPr lang="en-US" altLang="zh-CN" sz="1200" b="0" dirty="0">
+                <a:solidFill>
+                  <a:srgbClr val="CCCCCC"/>
+                </a:solidFill>
+                <a:effectLst/>
+              </a:rPr>
+              <a:t>: The type of hardware accelerator that is adapted, with common values including </a:t>
+            </a:r>
+            <a:r>
+              <a:rPr lang="en-US" altLang="zh-CN" sz="1200" b="0" dirty="0">
+                <a:solidFill>
+                  <a:srgbClr val="CE9178"/>
+                </a:solidFill>
+                <a:effectLst/>
+                <a:latin typeface="Consolas" panose="020B0609020204030204" pitchFamily="49" charset="0"/>
+              </a:rPr>
+              <a:t>CPU</a:t>
+            </a:r>
+            <a:r>
+              <a:rPr lang="en-US" altLang="zh-CN" sz="1200" b="0" dirty="0">
+                <a:solidFill>
+                  <a:srgbClr val="CCCCCC"/>
+                </a:solidFill>
+                <a:effectLst/>
+              </a:rPr>
+              <a:t>, </a:t>
+            </a:r>
+            <a:r>
+              <a:rPr lang="en-US" altLang="zh-CN" sz="1200" b="0" dirty="0">
+                <a:solidFill>
+                  <a:srgbClr val="CE9178"/>
+                </a:solidFill>
+                <a:effectLst/>
+                <a:latin typeface="Consolas" panose="020B0609020204030204" pitchFamily="49" charset="0"/>
+              </a:rPr>
+              <a:t>GPU</a:t>
+            </a:r>
+            <a:r>
+              <a:rPr lang="en-US" altLang="zh-CN" sz="1200" b="0" dirty="0">
+                <a:solidFill>
+                  <a:srgbClr val="CCCCCC"/>
+                </a:solidFill>
+                <a:effectLst/>
+              </a:rPr>
+              <a:t> and </a:t>
+            </a:r>
+            <a:r>
+              <a:rPr lang="en-US" altLang="zh-CN" sz="1200" b="0" dirty="0">
+                <a:solidFill>
+                  <a:srgbClr val="CE9178"/>
+                </a:solidFill>
+                <a:effectLst/>
+                <a:latin typeface="Consolas" panose="020B0609020204030204" pitchFamily="49" charset="0"/>
+              </a:rPr>
+              <a:t>NPU</a:t>
+            </a:r>
+            <a:r>
+              <a:rPr lang="en-US" altLang="zh-CN" sz="1200" b="0" dirty="0">
+                <a:solidFill>
+                  <a:srgbClr val="CCCCCC"/>
+                </a:solidFill>
+                <a:effectLst/>
+              </a:rPr>
+              <a:t>.</a:t>
+            </a:r>
+          </a:p>
+          <a:p>
+            <a:pPr marL="360000" lvl="1" indent="-171450">
+              <a:lnSpc>
+                <a:spcPts val="1425"/>
+              </a:lnSpc>
+              <a:buFont typeface="Arial" panose="020B0604020202020204" pitchFamily="34" charset="0"/>
+              <a:buChar char="•"/>
+            </a:pPr>
+            <a:r>
+              <a:rPr lang="en-US" altLang="zh-CN" sz="1200" b="0" dirty="0" err="1">
+                <a:solidFill>
+                  <a:srgbClr val="CE9178"/>
+                </a:solidFill>
+                <a:effectLst/>
+                <a:latin typeface="Consolas" panose="020B0609020204030204" pitchFamily="49" charset="0"/>
+              </a:rPr>
+              <a:t>executionProvider</a:t>
+            </a:r>
+            <a:r>
+              <a:rPr lang="en-US" altLang="zh-CN" sz="1200" b="0" dirty="0">
+                <a:solidFill>
+                  <a:srgbClr val="CCCCCC"/>
+                </a:solidFill>
+                <a:effectLst/>
+                <a:latin typeface="Consolas" panose="020B0609020204030204" pitchFamily="49" charset="0"/>
+              </a:rPr>
+              <a:t> </a:t>
+            </a:r>
+            <a:r>
+              <a:rPr lang="en-US" altLang="zh-CN" sz="1200" b="0" i="1" dirty="0">
+                <a:solidFill>
+                  <a:schemeClr val="tx1">
+                    <a:lumMod val="50000"/>
+                  </a:schemeClr>
+                </a:solidFill>
+                <a:effectLst/>
+                <a:latin typeface="Consolas" panose="020B0609020204030204" pitchFamily="49" charset="0"/>
+              </a:rPr>
+              <a:t>string</a:t>
+            </a:r>
+            <a:r>
+              <a:rPr lang="en-US" altLang="zh-CN" sz="1200" b="0" dirty="0">
+                <a:solidFill>
+                  <a:srgbClr val="CCCCCC"/>
+                </a:solidFill>
+                <a:effectLst/>
+              </a:rPr>
+              <a:t>: Represents EP.</a:t>
+            </a:r>
+          </a:p>
+          <a:p>
+            <a:pPr marL="171450" indent="-171450">
+              <a:lnSpc>
+                <a:spcPts val="1425"/>
+              </a:lnSpc>
+              <a:buFont typeface="Arial" panose="020B0604020202020204" pitchFamily="34" charset="0"/>
+              <a:buChar char="•"/>
+            </a:pPr>
+            <a:r>
+              <a:rPr lang="en-US" altLang="zh-CN" sz="1200" b="0" dirty="0">
+                <a:solidFill>
+                  <a:srgbClr val="CE9178"/>
+                </a:solidFill>
+                <a:effectLst/>
+                <a:latin typeface="Consolas" panose="020B0609020204030204" pitchFamily="49" charset="0"/>
+              </a:rPr>
+              <a:t>license</a:t>
+            </a:r>
+            <a:r>
+              <a:rPr lang="en-US" altLang="zh-CN" sz="1200" b="0" dirty="0">
+                <a:solidFill>
+                  <a:srgbClr val="CCCCCC"/>
+                </a:solidFill>
+                <a:effectLst/>
+                <a:latin typeface="Consolas" panose="020B0609020204030204" pitchFamily="49" charset="0"/>
+              </a:rPr>
+              <a:t> </a:t>
+            </a:r>
+            <a:r>
+              <a:rPr lang="en-US" altLang="zh-CN" sz="1200" b="0" i="1" dirty="0">
+                <a:solidFill>
+                  <a:schemeClr val="tx1">
+                    <a:lumMod val="50000"/>
+                  </a:schemeClr>
+                </a:solidFill>
+                <a:effectLst/>
+                <a:latin typeface="Consolas" panose="020B0609020204030204" pitchFamily="49" charset="0"/>
+              </a:rPr>
+              <a:t>string</a:t>
+            </a:r>
+            <a:r>
+              <a:rPr lang="en-US" altLang="zh-CN" sz="1200" b="0" dirty="0">
+                <a:solidFill>
+                  <a:srgbClr val="CCCCCC"/>
+                </a:solidFill>
+                <a:effectLst/>
+                <a:latin typeface="Consolas" panose="020B0609020204030204" pitchFamily="49" charset="0"/>
+              </a:rPr>
+              <a:t>: license.</a:t>
+            </a:r>
+          </a:p>
+          <a:p>
+            <a:pPr marL="171450" indent="-171450">
+              <a:lnSpc>
+                <a:spcPts val="1425"/>
+              </a:lnSpc>
+              <a:buFont typeface="Arial" panose="020B0604020202020204" pitchFamily="34" charset="0"/>
+              <a:buChar char="•"/>
+            </a:pPr>
+            <a:r>
+              <a:rPr lang="en-US" altLang="zh-CN" sz="1200" dirty="0">
+                <a:solidFill>
+                  <a:srgbClr val="CCCCCC"/>
+                </a:solidFill>
+                <a:latin typeface="Consolas" panose="020B0609020204030204" pitchFamily="49" charset="0"/>
+              </a:rPr>
+              <a:t>Others, e.g. </a:t>
+            </a:r>
+            <a:r>
+              <a:rPr lang="en-US" altLang="zh-CN" sz="1200" dirty="0" err="1">
+                <a:solidFill>
+                  <a:srgbClr val="CE9178"/>
+                </a:solidFill>
+                <a:latin typeface="Consolas" panose="020B0609020204030204" pitchFamily="49" charset="0"/>
+              </a:rPr>
+              <a:t>modelType</a:t>
+            </a:r>
+            <a:r>
+              <a:rPr lang="en-US" altLang="zh-CN" sz="1200" dirty="0">
+                <a:solidFill>
+                  <a:srgbClr val="CCCCCC"/>
+                </a:solidFill>
+                <a:latin typeface="Consolas" panose="020B0609020204030204" pitchFamily="49" charset="0"/>
+              </a:rPr>
+              <a:t>, </a:t>
+            </a:r>
+            <a:r>
+              <a:rPr lang="en-US" altLang="zh-CN" sz="1200" dirty="0" err="1">
+                <a:solidFill>
+                  <a:srgbClr val="CE9178"/>
+                </a:solidFill>
+                <a:latin typeface="Consolas" panose="020B0609020204030204" pitchFamily="49" charset="0"/>
+              </a:rPr>
+              <a:t>promptTemplate</a:t>
+            </a:r>
+            <a:r>
+              <a:rPr lang="en-US" altLang="zh-CN" sz="1200" dirty="0">
+                <a:solidFill>
+                  <a:srgbClr val="CCCCCC"/>
+                </a:solidFill>
+                <a:latin typeface="Consolas" panose="020B0609020204030204" pitchFamily="49" charset="0"/>
+              </a:rPr>
+              <a:t>, </a:t>
+            </a:r>
+            <a:r>
+              <a:rPr lang="en-US" altLang="zh-CN" sz="1200" dirty="0" err="1">
+                <a:solidFill>
+                  <a:srgbClr val="CE9178"/>
+                </a:solidFill>
+                <a:latin typeface="Consolas" panose="020B0609020204030204" pitchFamily="49" charset="0"/>
+              </a:rPr>
+              <a:t>fileSizeMb</a:t>
+            </a:r>
+            <a:r>
+              <a:rPr lang="en-US" altLang="zh-CN" sz="1200" dirty="0">
+                <a:solidFill>
+                  <a:srgbClr val="CCCCCC"/>
+                </a:solidFill>
+                <a:latin typeface="Consolas" panose="020B0609020204030204" pitchFamily="49" charset="0"/>
+              </a:rPr>
+              <a:t>.</a:t>
+            </a:r>
+            <a:endParaRPr lang="en-US" altLang="zh-CN" sz="1200" b="0" dirty="0">
+              <a:solidFill>
+                <a:srgbClr val="CCCCCC"/>
+              </a:solidFill>
+              <a:effectLst/>
+              <a:latin typeface="Consolas" panose="020B0609020204030204" pitchFamily="49" charset="0"/>
+            </a:endParaRPr>
+          </a:p>
+        </p:txBody>
+      </p:sp>
+      <p:pic>
+        <p:nvPicPr>
+          <p:cNvPr id="7" name="图形 6" descr="文件夹 纯色填充">
+            <a:extLst>
+              <a:ext uri="{FF2B5EF4-FFF2-40B4-BE49-F238E27FC236}">
+                <a16:creationId xmlns:a16="http://schemas.microsoft.com/office/drawing/2014/main" id="{C5E6D806-826E-08E9-FFF1-5F35CCD156CB}"/>
+              </a:ext>
+            </a:extLst>
+          </p:cNvPr>
+          <p:cNvPicPr>
+            <a:picLocks noChangeAspect="1"/>
+          </p:cNvPicPr>
+          <p:nvPr/>
+        </p:nvPicPr>
+        <p:blipFill>
+          <a:blip r:embed="rId2">
+            <a:extLst>
+              <a:ext uri="{96DAC541-7B7A-43D3-8B79-37D633B846F1}">
+                <asvg:svgBlip xmlns:asvg="http://schemas.microsoft.com/office/drawing/2016/SVG/main" r:embed="rId3"/>
+              </a:ext>
+            </a:extLst>
+          </a:blip>
+          <a:stretch>
+            <a:fillRect/>
+          </a:stretch>
+        </p:blipFill>
+        <p:spPr>
+          <a:xfrm>
+            <a:off x="6325633" y="3652993"/>
+            <a:ext cx="288000" cy="288000"/>
+          </a:xfrm>
+          <a:prstGeom prst="rect">
+            <a:avLst/>
+          </a:prstGeom>
+        </p:spPr>
+      </p:pic>
+      <p:sp>
+        <p:nvSpPr>
+          <p:cNvPr id="9" name="文本框 8">
+            <a:extLst>
+              <a:ext uri="{FF2B5EF4-FFF2-40B4-BE49-F238E27FC236}">
+                <a16:creationId xmlns:a16="http://schemas.microsoft.com/office/drawing/2014/main" id="{D9357ED0-E889-E86D-E9F8-F60174761B64}"/>
+              </a:ext>
+            </a:extLst>
+          </p:cNvPr>
+          <p:cNvSpPr txBox="1"/>
+          <p:nvPr/>
+        </p:nvSpPr>
+        <p:spPr>
+          <a:xfrm>
+            <a:off x="6606806" y="4004444"/>
+            <a:ext cx="756000" cy="288000"/>
+          </a:xfrm>
+          <a:prstGeom prst="rect">
+            <a:avLst/>
+          </a:prstGeom>
+          <a:noFill/>
+        </p:spPr>
+        <p:txBody>
+          <a:bodyPr wrap="none" rtlCol="0">
+            <a:noAutofit/>
+          </a:bodyPr>
+          <a:lstStyle/>
+          <a:p>
+            <a:r>
+              <a:rPr lang="en-US" altLang="zh-CN" sz="1200" dirty="0"/>
+              <a:t>Model D</a:t>
+            </a:r>
+            <a:endParaRPr lang="zh-CN" altLang="en-US" sz="1200" dirty="0"/>
+          </a:p>
+        </p:txBody>
+      </p:sp>
+      <p:sp>
+        <p:nvSpPr>
+          <p:cNvPr id="14" name="文本框 13">
+            <a:extLst>
+              <a:ext uri="{FF2B5EF4-FFF2-40B4-BE49-F238E27FC236}">
+                <a16:creationId xmlns:a16="http://schemas.microsoft.com/office/drawing/2014/main" id="{8932643D-9591-6F20-8D2A-7B17EED1CAF6}"/>
+              </a:ext>
+            </a:extLst>
+          </p:cNvPr>
+          <p:cNvSpPr txBox="1"/>
+          <p:nvPr/>
+        </p:nvSpPr>
+        <p:spPr>
+          <a:xfrm>
+            <a:off x="6606754" y="4370591"/>
+            <a:ext cx="1505922" cy="504000"/>
+          </a:xfrm>
+          <a:prstGeom prst="rect">
+            <a:avLst/>
+          </a:prstGeom>
+          <a:noFill/>
+        </p:spPr>
+        <p:txBody>
+          <a:bodyPr wrap="none" rtlCol="0">
+            <a:noAutofit/>
+          </a:bodyPr>
+          <a:lstStyle/>
+          <a:p>
+            <a:r>
+              <a:rPr lang="en-US" altLang="zh-CN" sz="1200" dirty="0" err="1"/>
+              <a:t>foundry.modelinfo</a:t>
+            </a:r>
+            <a:br>
+              <a:rPr lang="en-US" altLang="zh-CN" sz="1200" dirty="0"/>
+            </a:br>
+            <a:r>
+              <a:rPr lang="en-US" altLang="zh-CN" sz="1200" dirty="0"/>
+              <a:t>.</a:t>
+            </a:r>
+            <a:r>
+              <a:rPr lang="en-US" altLang="zh-CN" sz="1200" dirty="0" err="1"/>
+              <a:t>json</a:t>
+            </a:r>
+            <a:endParaRPr lang="en-US" altLang="zh-CN" sz="1200" dirty="0"/>
+          </a:p>
+        </p:txBody>
+      </p:sp>
+      <p:cxnSp>
+        <p:nvCxnSpPr>
+          <p:cNvPr id="16" name="连接符: 肘形 15">
+            <a:extLst>
+              <a:ext uri="{FF2B5EF4-FFF2-40B4-BE49-F238E27FC236}">
+                <a16:creationId xmlns:a16="http://schemas.microsoft.com/office/drawing/2014/main" id="{4AD0701B-806D-0A0B-8389-9A01AAFEF653}"/>
+              </a:ext>
+            </a:extLst>
+          </p:cNvPr>
+          <p:cNvCxnSpPr>
+            <a:cxnSpLocks/>
+            <a:stCxn id="54" idx="3"/>
+            <a:endCxn id="58" idx="2"/>
+          </p:cNvCxnSpPr>
+          <p:nvPr/>
+        </p:nvCxnSpPr>
+        <p:spPr>
+          <a:xfrm flipV="1">
+            <a:off x="6023322" y="4713735"/>
+            <a:ext cx="448446" cy="1057191"/>
+          </a:xfrm>
+          <a:prstGeom prst="bentConnector2">
+            <a:avLst/>
+          </a:prstGeom>
+          <a:ln>
+            <a:solidFill>
+              <a:schemeClr val="tx1">
+                <a:lumMod val="75000"/>
+              </a:schemeClr>
+            </a:solidFill>
+            <a:tailEnd type="triangle"/>
+          </a:ln>
+        </p:spPr>
+        <p:style>
+          <a:lnRef idx="2">
+            <a:schemeClr val="accent1"/>
+          </a:lnRef>
+          <a:fillRef idx="0">
+            <a:schemeClr val="accent1"/>
+          </a:fillRef>
+          <a:effectRef idx="1">
+            <a:schemeClr val="accent1"/>
+          </a:effectRef>
+          <a:fontRef idx="minor">
+            <a:schemeClr val="tx1"/>
+          </a:fontRef>
+        </p:style>
+      </p:cxnSp>
+      <p:sp>
+        <p:nvSpPr>
+          <p:cNvPr id="22" name="文本框 21">
+            <a:extLst>
+              <a:ext uri="{FF2B5EF4-FFF2-40B4-BE49-F238E27FC236}">
+                <a16:creationId xmlns:a16="http://schemas.microsoft.com/office/drawing/2014/main" id="{E7B1EAD2-4D7A-35F2-DD79-31B10DC1DB88}"/>
+              </a:ext>
+            </a:extLst>
+          </p:cNvPr>
+          <p:cNvSpPr txBox="1"/>
+          <p:nvPr/>
+        </p:nvSpPr>
+        <p:spPr>
+          <a:xfrm>
+            <a:off x="6469633" y="5513470"/>
+            <a:ext cx="576000" cy="288000"/>
+          </a:xfrm>
+          <a:prstGeom prst="rect">
+            <a:avLst/>
+          </a:prstGeom>
+          <a:noFill/>
+        </p:spPr>
+        <p:txBody>
+          <a:bodyPr wrap="none" rtlCol="0">
+            <a:noAutofit/>
+          </a:bodyPr>
+          <a:lstStyle/>
+          <a:p>
+            <a:r>
+              <a:rPr lang="en-US" altLang="zh-CN" sz="1200" dirty="0">
+                <a:solidFill>
+                  <a:schemeClr val="tx1">
+                    <a:lumMod val="75000"/>
+                  </a:schemeClr>
+                </a:solidFill>
+              </a:rPr>
+              <a:t>Cache</a:t>
+            </a:r>
+          </a:p>
+        </p:txBody>
+      </p:sp>
+    </p:spTree>
+    <p:extLst>
+      <p:ext uri="{BB962C8B-B14F-4D97-AF65-F5344CB8AC3E}">
+        <p14:creationId xmlns:p14="http://schemas.microsoft.com/office/powerpoint/2010/main" val="3931668585"/>
+      </p:ext>
+    </p:extLst>
+  </p:cSld>
+  <p:clrMapOvr>
+    <a:masterClrMapping/>
+  </p:clrMapOvr>
+</p:sld>
+</file>
+
+<file path=ppt/slides/slide6.xml><?xml version="1.0" encoding="utf-8"?>
+<p:sld xmlns:a="http://schemas.openxmlformats.org/drawingml/2006/main" xmlns:r="http://schemas.openxmlformats.org/officeDocument/2006/relationships" xmlns:p="http://schemas.openxmlformats.org/presentationml/2006/main">
+  <p:cSld>
+    <p:spTree>
+      <p:nvGrpSpPr>
+        <p:cNvPr id="1" name="">
+          <a:extLst>
+            <a:ext uri="{FF2B5EF4-FFF2-40B4-BE49-F238E27FC236}">
               <a16:creationId xmlns:a16="http://schemas.microsoft.com/office/drawing/2014/main" id="{20CE1834-7CBA-0A24-49BC-6D36F191EEFB}"/>
             </a:ext>
           </a:extLst>
@@ -7939,13 +11343,6 @@
               <a:rPr lang="en-US" altLang="zh-CN" sz="1600" dirty="0"/>
               <a:t>Storage</a:t>
             </a:r>
-            <a:br>
-              <a:rPr lang="en-US" altLang="zh-CN" sz="1600" dirty="0"/>
-            </a:br>
-            <a:r>
-              <a:rPr lang="en-US" altLang="zh-CN" sz="1600" dirty="0"/>
-              <a:t>(Local)</a:t>
-            </a:r>
             <a:endParaRPr lang="zh-CN" altLang="en-US" sz="1600" dirty="0"/>
           </a:p>
         </p:txBody>
@@ -8020,11 +11417,13 @@
               <a:gd name="adj" fmla="val 15155"/>
             </a:avLst>
           </a:prstGeom>
-          <a:noFill/>
+          <a:solidFill>
+            <a:schemeClr val="accent4">
+              <a:lumMod val="75000"/>
+            </a:schemeClr>
+          </a:solidFill>
           <a:ln>
-            <a:solidFill>
-              <a:schemeClr val="accent4"/>
-            </a:solidFill>
+            <a:noFill/>
           </a:ln>
         </p:spPr>
         <p:style>
@@ -9454,10 +12853,22 @@
           <a:lstStyle/>
           <a:p>
             <a:r>
-              <a:rPr lang="en-US" altLang="zh-CN" sz="1400" dirty="0"/>
+              <a:rPr lang="en-US" altLang="zh-CN" sz="1400" dirty="0">
+                <a:solidFill>
+                  <a:schemeClr val="tx1">
+                    <a:lumMod val="95000"/>
+                  </a:schemeClr>
+                </a:solidFill>
+              </a:rPr>
               <a:t>Azure AI Foundry Catalog</a:t>
             </a:r>
-            <a:endParaRPr lang="zh-CN" altLang="en-US" sz="1400" dirty="0"/>
+            <a:endParaRPr lang="zh-CN" altLang="en-US" sz="1400" dirty="0">
+              <a:solidFill>
+                <a:schemeClr val="tx1">
+                  <a:lumMod val="95000"/>
+                </a:schemeClr>
+              </a:solidFill>
+            </a:endParaRPr>
           </a:p>
         </p:txBody>
       </p:sp>
@@ -9514,6 +12925,102 @@
           </a:fontRef>
         </p:style>
       </p:cxnSp>
+      <p:sp>
+        <p:nvSpPr>
+          <p:cNvPr id="12" name="文本框 11">
+            <a:extLst>
+              <a:ext uri="{FF2B5EF4-FFF2-40B4-BE49-F238E27FC236}">
+                <a16:creationId xmlns:a16="http://schemas.microsoft.com/office/drawing/2014/main" id="{362E8A4C-4969-8A64-AD32-9A8922BE427E}"/>
+              </a:ext>
+            </a:extLst>
+          </p:cNvPr>
+          <p:cNvSpPr txBox="1"/>
+          <p:nvPr/>
+        </p:nvSpPr>
+        <p:spPr>
+          <a:xfrm>
+            <a:off x="8043099" y="2493019"/>
+            <a:ext cx="3452227" cy="307777"/>
+          </a:xfrm>
+          <a:prstGeom prst="rect">
+            <a:avLst/>
+          </a:prstGeom>
+          <a:noFill/>
+        </p:spPr>
+        <p:txBody>
+          <a:bodyPr wrap="none" rtlCol="0">
+            <a:spAutoFit/>
+          </a:bodyPr>
+          <a:lstStyle/>
+          <a:p>
+            <a:r>
+              <a:rPr lang="en-US" altLang="zh-CN" sz="1400" dirty="0">
+                <a:solidFill>
+                  <a:schemeClr val="tx1">
+                    <a:lumMod val="75000"/>
+                  </a:schemeClr>
+                </a:solidFill>
+              </a:rPr>
+              <a:t>%USERPROFILE%\.foundry\cache\models</a:t>
+            </a:r>
+            <a:endParaRPr lang="zh-CN" altLang="en-US" sz="1400" dirty="0">
+              <a:solidFill>
+                <a:schemeClr val="tx1">
+                  <a:lumMod val="75000"/>
+                </a:schemeClr>
+              </a:solidFill>
+            </a:endParaRPr>
+          </a:p>
+        </p:txBody>
+      </p:sp>
+      <p:sp>
+        <p:nvSpPr>
+          <p:cNvPr id="14" name="文本框 13">
+            <a:extLst>
+              <a:ext uri="{FF2B5EF4-FFF2-40B4-BE49-F238E27FC236}">
+                <a16:creationId xmlns:a16="http://schemas.microsoft.com/office/drawing/2014/main" id="{A90E668A-034C-3AB4-327A-7C9B62B2EE1F}"/>
+              </a:ext>
+            </a:extLst>
+          </p:cNvPr>
+          <p:cNvSpPr txBox="1"/>
+          <p:nvPr/>
+        </p:nvSpPr>
+        <p:spPr>
+          <a:xfrm>
+            <a:off x="693976" y="2113193"/>
+            <a:ext cx="593432" cy="307777"/>
+          </a:xfrm>
+          <a:prstGeom prst="rect">
+            <a:avLst/>
+          </a:prstGeom>
+          <a:noFill/>
+        </p:spPr>
+        <p:txBody>
+          <a:bodyPr wrap="none" rtlCol="0">
+            <a:spAutoFit/>
+          </a:bodyPr>
+          <a:lstStyle/>
+          <a:p>
+            <a:r>
+              <a:rPr lang="en-US" altLang="zh-CN" sz="1400" dirty="0">
+                <a:solidFill>
+                  <a:schemeClr val="tx1">
+                    <a:lumMod val="75000"/>
+                  </a:schemeClr>
+                </a:solidFill>
+              </a:rPr>
+              <a:t>Local</a:t>
+            </a:r>
+            <a:endParaRPr lang="zh-CN" altLang="en-US" sz="1400" dirty="0">
+              <a:solidFill>
+                <a:schemeClr val="tx1">
+                  <a:lumMod val="75000"/>
+                </a:schemeClr>
+              </a:solidFill>
+            </a:endParaRPr>
+          </a:p>
+        </p:txBody>
+      </p:sp>
     </p:spTree>
     <p:extLst>
       <p:ext uri="{BB962C8B-B14F-4D97-AF65-F5344CB8AC3E}">
@@ -9527,7 +13034,7 @@
 </p:sld>
 </file>
 
-<file path=ppt/slides/slide6.xml><?xml version="1.0" encoding="utf-8"?>
+<file path=ppt/slides/slide7.xml><?xml version="1.0" encoding="utf-8"?>
 <p:sld xmlns:a="http://schemas.openxmlformats.org/drawingml/2006/main" xmlns:r="http://schemas.openxmlformats.org/officeDocument/2006/relationships" xmlns:p="http://schemas.openxmlformats.org/presentationml/2006/main">
   <p:cSld>
     <p:spTree>
@@ -9552,6 +13059,79 @@
       </p:grpSpPr>
       <p:sp>
         <p:nvSpPr>
+          <p:cNvPr id="10" name="文本框 9">
+            <a:extLst>
+              <a:ext uri="{FF2B5EF4-FFF2-40B4-BE49-F238E27FC236}">
+                <a16:creationId xmlns:a16="http://schemas.microsoft.com/office/drawing/2014/main" id="{2D50614E-0285-7A9E-FFCE-CF6B0C26D0DC}"/>
+              </a:ext>
+            </a:extLst>
+          </p:cNvPr>
+          <p:cNvSpPr txBox="1"/>
+          <p:nvPr/>
+        </p:nvSpPr>
+        <p:spPr>
+          <a:xfrm>
+            <a:off x="2163553" y="5224211"/>
+            <a:ext cx="1728000" cy="504000"/>
+          </a:xfrm>
+          <a:prstGeom prst="roundRect">
+            <a:avLst/>
+          </a:prstGeom>
+          <a:solidFill>
+            <a:schemeClr val="bg1">
+              <a:lumMod val="85000"/>
+              <a:lumOff val="15000"/>
+            </a:schemeClr>
+          </a:solidFill>
+        </p:spPr>
+        <p:txBody>
+          <a:bodyPr wrap="square" anchor="ctr">
+            <a:noAutofit/>
+          </a:bodyPr>
+          <a:lstStyle/>
+          <a:p>
+            <a:pPr algn="ctr"/>
+            <a:r>
+              <a:rPr lang="en-US" altLang="zh-CN" sz="1200" dirty="0">
+                <a:solidFill>
+                  <a:schemeClr val="tx1">
+                    <a:lumMod val="75000"/>
+                  </a:schemeClr>
+                </a:solidFill>
+              </a:rPr>
+              <a:t>Fully compatible with</a:t>
+            </a:r>
+            <a:br>
+              <a:rPr lang="en-US" altLang="zh-CN" sz="1200" dirty="0">
+                <a:solidFill>
+                  <a:schemeClr val="tx1">
+                    <a:lumMod val="75000"/>
+                  </a:schemeClr>
+                </a:solidFill>
+              </a:rPr>
+            </a:br>
+            <a:r>
+              <a:rPr lang="en-US" altLang="zh-CN" sz="1200" dirty="0">
+                <a:solidFill>
+                  <a:schemeClr val="tx1">
+                    <a:lumMod val="75000"/>
+                  </a:schemeClr>
+                </a:solidFill>
+              </a:rPr>
+              <a:t>REST API of OpenAI</a:t>
+            </a:r>
+            <a:endParaRPr lang="zh-CN" altLang="en-US" sz="1200" dirty="0">
+              <a:solidFill>
+                <a:schemeClr val="tx1">
+                  <a:lumMod val="75000"/>
+                </a:schemeClr>
+              </a:solidFill>
+            </a:endParaRPr>
+          </a:p>
+        </p:txBody>
+      </p:sp>
+      <p:sp>
+        <p:nvSpPr>
           <p:cNvPr id="44" name="矩形: 圆角 43">
             <a:extLst>
               <a:ext uri="{FF2B5EF4-FFF2-40B4-BE49-F238E27FC236}">
@@ -11623,7 +15203,7 @@
         </p:nvSpPr>
         <p:spPr>
           <a:xfrm rot="21234905">
-            <a:off x="2416289" y="5636706"/>
+            <a:off x="2416289" y="5946357"/>
             <a:ext cx="1229054" cy="307777"/>
           </a:xfrm>
           <a:prstGeom prst="rect">
@@ -11917,7 +15497,7 @@
 </p:sld>
 </file>
 
-<file path=ppt/slides/slide7.xml><?xml version="1.0" encoding="utf-8"?>
+<file path=ppt/slides/slide8.xml><?xml version="1.0" encoding="utf-8"?>
 <p:sld xmlns:a="http://schemas.openxmlformats.org/drawingml/2006/main" xmlns:r="http://schemas.openxmlformats.org/officeDocument/2006/relationships" xmlns:p="http://schemas.openxmlformats.org/presentationml/2006/main">
   <p:cSld>
     <p:spTree>
@@ -12323,7 +15903,7 @@
           <p:nvPr>
             <p:extLst>
               <p:ext uri="{D42A27DB-BD31-4B8C-83A1-F6EECF244321}">
-                <p14:modId xmlns:p14="http://schemas.microsoft.com/office/powerpoint/2010/main" val="1594481130"/>
+                <p14:modId xmlns:p14="http://schemas.microsoft.com/office/powerpoint/2010/main" val="120059097"/>
               </p:ext>
             </p:extLst>
           </p:nvPr>
@@ -12635,15 +16215,7 @@
                     <a:p>
                       <a:r>
                         <a:rPr lang="en-US" altLang="zh-CN" sz="1400" dirty="0"/>
-                        <a:t>POST /</a:t>
-                      </a:r>
-                      <a:r>
-                        <a:rPr lang="en-US" altLang="zh-CN" sz="1400" dirty="0" err="1"/>
-                        <a:t>openai</a:t>
-                      </a:r>
-                      <a:r>
-                        <a:rPr lang="en-US" altLang="zh-CN" sz="1400" dirty="0"/>
-                        <a:t>/download</a:t>
+                        <a:t>POST /v1/chat/completions</a:t>
                       </a:r>
                       <a:endParaRPr lang="zh-CN" altLang="en-US" sz="1400" dirty="0">
                         <a:latin typeface="Consolas" panose="020B0609020204030204" pitchFamily="49" charset="0"/>
@@ -12800,7 +16372,7 @@
         </p:blipFill>
         <p:spPr>
           <a:xfrm>
-            <a:off x="691784" y="1692816"/>
+            <a:off x="691784" y="1272650"/>
             <a:ext cx="864000" cy="864000"/>
           </a:xfrm>
           <a:prstGeom prst="rect">
@@ -12886,6 +16458,247 @@
               <a:t>……</a:t>
             </a:r>
             <a:endParaRPr lang="zh-CN" altLang="en-US" sz="1400" dirty="0"/>
+          </a:p>
+        </p:txBody>
+      </p:sp>
+      <p:sp>
+        <p:nvSpPr>
+          <p:cNvPr id="10" name="文本框 9">
+            <a:extLst>
+              <a:ext uri="{FF2B5EF4-FFF2-40B4-BE49-F238E27FC236}">
+                <a16:creationId xmlns:a16="http://schemas.microsoft.com/office/drawing/2014/main" id="{AEA18412-66D4-8288-7EC7-662CD8DAF362}"/>
+              </a:ext>
+            </a:extLst>
+          </p:cNvPr>
+          <p:cNvSpPr txBox="1"/>
+          <p:nvPr/>
+        </p:nvSpPr>
+        <p:spPr>
+          <a:xfrm>
+            <a:off x="694542" y="2078720"/>
+            <a:ext cx="2534128" cy="1415772"/>
+          </a:xfrm>
+          <a:prstGeom prst="rect">
+            <a:avLst/>
+          </a:prstGeom>
+          <a:noFill/>
+        </p:spPr>
+        <p:txBody>
+          <a:bodyPr wrap="none" lIns="108000" tIns="0" rIns="108000" bIns="0" rtlCol="0">
+            <a:spAutoFit/>
+          </a:bodyPr>
+          <a:lstStyle/>
+          <a:p>
+            <a:pPr marL="171450" indent="-171450">
+              <a:buFont typeface="Arial" panose="020B0604020202020204" pitchFamily="34" charset="0"/>
+              <a:buChar char="•"/>
+            </a:pPr>
+            <a:r>
+              <a:rPr lang="en-US" altLang="zh-CN" sz="1200" dirty="0">
+                <a:solidFill>
+                  <a:schemeClr val="bg1">
+                    <a:lumMod val="75000"/>
+                    <a:lumOff val="25000"/>
+                  </a:schemeClr>
+                </a:solidFill>
+              </a:rPr>
+              <a:t>CLI</a:t>
+            </a:r>
+          </a:p>
+          <a:p>
+            <a:pPr marL="171450" indent="-171450">
+              <a:buFont typeface="Arial" panose="020B0604020202020204" pitchFamily="34" charset="0"/>
+              <a:buChar char="•"/>
+            </a:pPr>
+            <a:r>
+              <a:rPr lang="en-US" altLang="zh-CN" sz="1200" dirty="0">
+                <a:solidFill>
+                  <a:schemeClr val="bg1">
+                    <a:lumMod val="75000"/>
+                    <a:lumOff val="25000"/>
+                  </a:schemeClr>
+                </a:solidFill>
+              </a:rPr>
+              <a:t>HTTP localhost</a:t>
+            </a:r>
+          </a:p>
+          <a:p>
+            <a:pPr marL="171450" indent="-171450">
+              <a:buFont typeface="Arial" panose="020B0604020202020204" pitchFamily="34" charset="0"/>
+              <a:buChar char="•"/>
+            </a:pPr>
+            <a:r>
+              <a:rPr lang="en-US" altLang="zh-CN" sz="1200" dirty="0">
+                <a:solidFill>
+                  <a:schemeClr val="bg1">
+                    <a:lumMod val="75000"/>
+                    <a:lumOff val="25000"/>
+                  </a:schemeClr>
+                </a:solidFill>
+              </a:rPr>
+              <a:t>Named pipeline</a:t>
+            </a:r>
+          </a:p>
+          <a:p>
+            <a:pPr marL="171450" indent="-171450">
+              <a:buFont typeface="Arial" panose="020B0604020202020204" pitchFamily="34" charset="0"/>
+              <a:buChar char="•"/>
+            </a:pPr>
+            <a:r>
+              <a:rPr lang="en-US" altLang="zh-CN" sz="1200" dirty="0">
+                <a:solidFill>
+                  <a:schemeClr val="bg1">
+                    <a:lumMod val="75000"/>
+                    <a:lumOff val="25000"/>
+                  </a:schemeClr>
+                </a:solidFill>
+              </a:rPr>
+              <a:t>SDKs</a:t>
+            </a:r>
+          </a:p>
+          <a:p>
+            <a:pPr marL="360000" lvl="1" indent="-171450">
+              <a:buFont typeface="Arial" panose="020B0604020202020204" pitchFamily="34" charset="0"/>
+              <a:buChar char="•"/>
+            </a:pPr>
+            <a:r>
+              <a:rPr lang="en-US" altLang="zh-CN" sz="1100" dirty="0">
+                <a:solidFill>
+                  <a:schemeClr val="bg1">
+                    <a:lumMod val="75000"/>
+                    <a:lumOff val="25000"/>
+                  </a:schemeClr>
+                </a:solidFill>
+              </a:rPr>
+              <a:t>C# - </a:t>
+            </a:r>
+            <a:r>
+              <a:rPr lang="en-US" altLang="zh-CN" sz="1100" dirty="0" err="1">
+                <a:solidFill>
+                  <a:schemeClr val="bg1">
+                    <a:lumMod val="75000"/>
+                    <a:lumOff val="25000"/>
+                  </a:schemeClr>
+                </a:solidFill>
+              </a:rPr>
+              <a:t>Microsoft.AI.Foundry.Local</a:t>
+            </a:r>
+            <a:endParaRPr lang="en-US" altLang="zh-CN" sz="1100" dirty="0">
+              <a:solidFill>
+                <a:schemeClr val="bg1">
+                  <a:lumMod val="75000"/>
+                  <a:lumOff val="25000"/>
+                </a:schemeClr>
+              </a:solidFill>
+            </a:endParaRPr>
+          </a:p>
+          <a:p>
+            <a:pPr marL="360000" lvl="1" indent="-171450">
+              <a:buFont typeface="Arial" panose="020B0604020202020204" pitchFamily="34" charset="0"/>
+              <a:buChar char="•"/>
+            </a:pPr>
+            <a:r>
+              <a:rPr lang="en-US" altLang="zh-CN" sz="1100" dirty="0">
+                <a:solidFill>
+                  <a:schemeClr val="bg1">
+                    <a:lumMod val="75000"/>
+                    <a:lumOff val="25000"/>
+                  </a:schemeClr>
+                </a:solidFill>
+              </a:rPr>
+              <a:t>Node.js - foundry-local-</a:t>
+            </a:r>
+            <a:r>
+              <a:rPr lang="en-US" altLang="zh-CN" sz="1100" dirty="0" err="1">
+                <a:solidFill>
+                  <a:schemeClr val="bg1">
+                    <a:lumMod val="75000"/>
+                    <a:lumOff val="25000"/>
+                  </a:schemeClr>
+                </a:solidFill>
+              </a:rPr>
+              <a:t>sdk</a:t>
+            </a:r>
+            <a:endParaRPr lang="en-US" altLang="zh-CN" sz="1100" dirty="0">
+              <a:solidFill>
+                <a:schemeClr val="bg1">
+                  <a:lumMod val="75000"/>
+                  <a:lumOff val="25000"/>
+                </a:schemeClr>
+              </a:solidFill>
+            </a:endParaRPr>
+          </a:p>
+          <a:p>
+            <a:pPr marL="360000" lvl="1" indent="-171450">
+              <a:buFont typeface="Arial" panose="020B0604020202020204" pitchFamily="34" charset="0"/>
+              <a:buChar char="•"/>
+            </a:pPr>
+            <a:r>
+              <a:rPr lang="en-US" altLang="zh-CN" sz="1100" dirty="0">
+                <a:solidFill>
+                  <a:schemeClr val="bg1">
+                    <a:lumMod val="75000"/>
+                    <a:lumOff val="25000"/>
+                  </a:schemeClr>
+                </a:solidFill>
+              </a:rPr>
+              <a:t>Python - foundry-local-</a:t>
+            </a:r>
+            <a:r>
+              <a:rPr lang="en-US" altLang="zh-CN" sz="1100" dirty="0" err="1">
+                <a:solidFill>
+                  <a:schemeClr val="bg1">
+                    <a:lumMod val="75000"/>
+                    <a:lumOff val="25000"/>
+                  </a:schemeClr>
+                </a:solidFill>
+              </a:rPr>
+              <a:t>sdk</a:t>
+            </a:r>
+            <a:endParaRPr lang="en-US" altLang="zh-CN" sz="1100" dirty="0">
+              <a:solidFill>
+                <a:schemeClr val="bg1">
+                  <a:lumMod val="75000"/>
+                  <a:lumOff val="25000"/>
+                </a:schemeClr>
+              </a:solidFill>
+            </a:endParaRPr>
+          </a:p>
+          <a:p>
+            <a:pPr marL="360000" lvl="1" indent="-171450">
+              <a:buFont typeface="Arial" panose="020B0604020202020204" pitchFamily="34" charset="0"/>
+              <a:buChar char="•"/>
+            </a:pPr>
+            <a:r>
+              <a:rPr lang="en-US" altLang="zh-CN" sz="1100" dirty="0">
+                <a:solidFill>
+                  <a:schemeClr val="bg1">
+                    <a:lumMod val="75000"/>
+                    <a:lumOff val="25000"/>
+                  </a:schemeClr>
+                </a:solidFill>
+              </a:rPr>
+              <a:t>Rust - foundry-local-</a:t>
+            </a:r>
+            <a:r>
+              <a:rPr lang="en-US" altLang="zh-CN" sz="1100" dirty="0" err="1">
+                <a:solidFill>
+                  <a:schemeClr val="bg1">
+                    <a:lumMod val="75000"/>
+                    <a:lumOff val="25000"/>
+                  </a:schemeClr>
+                </a:solidFill>
+              </a:rPr>
+              <a:t>sdk</a:t>
+            </a:r>
+            <a:endParaRPr lang="en-US" altLang="zh-CN" sz="1200" dirty="0">
+              <a:solidFill>
+                <a:schemeClr val="bg1">
+                  <a:lumMod val="75000"/>
+                  <a:lumOff val="25000"/>
+                </a:schemeClr>
+              </a:solidFill>
+            </a:endParaRPr>
           </a:p>
         </p:txBody>
       </p:sp>
@@ -12902,7 +16715,7 @@
 </p:sld>
 </file>
 
-<file path=ppt/slides/slide8.xml><?xml version="1.0" encoding="utf-8"?>
+<file path=ppt/slides/slide9.xml><?xml version="1.0" encoding="utf-8"?>
 <p:sld xmlns:a="http://schemas.openxmlformats.org/drawingml/2006/main" xmlns:r="http://schemas.openxmlformats.org/officeDocument/2006/relationships" xmlns:p="http://schemas.openxmlformats.org/presentationml/2006/main">
   <p:cSld>
     <p:spTree>

</xml_diff>